<commit_message>
Update slides and workbooks
</commit_message>
<xml_diff>
--- a/2/s2_Building_your_first_website.pptx
+++ b/2/s2_Building_your_first_website.pptx
@@ -257,7 +257,7 @@
           <a:p>
             <a:fld id="{A9A5DA3C-BDF6-44EF-83ED-A29CA680A5AA}" type="datetimeFigureOut">
               <a:rPr lang="en-GB" smtClean="0"/>
-              <a:t>22/04/2024</a:t>
+              <a:t>10/07/2024</a:t>
             </a:fld>
             <a:endParaRPr lang="en-GB"/>
           </a:p>
@@ -674,7 +674,7 @@
           <a:p>
             <a:fld id="{1041D2DD-F029-4FB0-BB12-3B6037A6356B}" type="datetimeFigureOut">
               <a:rPr lang="en-GB" smtClean="0"/>
-              <a:t>22/04/2024</a:t>
+              <a:t>10/07/2024</a:t>
             </a:fld>
             <a:endParaRPr lang="en-GB"/>
           </a:p>
@@ -874,7 +874,7 @@
           <a:p>
             <a:fld id="{1041D2DD-F029-4FB0-BB12-3B6037A6356B}" type="datetimeFigureOut">
               <a:rPr lang="en-GB" smtClean="0"/>
-              <a:t>22/04/2024</a:t>
+              <a:t>10/07/2024</a:t>
             </a:fld>
             <a:endParaRPr lang="en-GB"/>
           </a:p>
@@ -1084,7 +1084,7 @@
           <a:p>
             <a:fld id="{1041D2DD-F029-4FB0-BB12-3B6037A6356B}" type="datetimeFigureOut">
               <a:rPr lang="en-GB" smtClean="0"/>
-              <a:t>22/04/2024</a:t>
+              <a:t>10/07/2024</a:t>
             </a:fld>
             <a:endParaRPr lang="en-GB"/>
           </a:p>
@@ -1288,7 +1288,7 @@
           <a:p>
             <a:fld id="{2E2C077B-C732-49E5-B20E-05DE29246531}" type="datetimeFigureOut">
               <a:rPr lang="en-GB" smtClean="0"/>
-              <a:t>22/04/2024</a:t>
+              <a:t>10/07/2024</a:t>
             </a:fld>
             <a:endParaRPr lang="en-GB"/>
           </a:p>
@@ -1458,7 +1458,7 @@
           <a:p>
             <a:fld id="{2E2C077B-C732-49E5-B20E-05DE29246531}" type="datetimeFigureOut">
               <a:rPr lang="en-GB" smtClean="0"/>
-              <a:t>22/04/2024</a:t>
+              <a:t>10/07/2024</a:t>
             </a:fld>
             <a:endParaRPr lang="en-GB"/>
           </a:p>
@@ -1704,7 +1704,7 @@
           <a:p>
             <a:fld id="{2E2C077B-C732-49E5-B20E-05DE29246531}" type="datetimeFigureOut">
               <a:rPr lang="en-GB" smtClean="0"/>
-              <a:t>22/04/2024</a:t>
+              <a:t>10/07/2024</a:t>
             </a:fld>
             <a:endParaRPr lang="en-GB"/>
           </a:p>
@@ -1936,7 +1936,7 @@
           <a:p>
             <a:fld id="{2E2C077B-C732-49E5-B20E-05DE29246531}" type="datetimeFigureOut">
               <a:rPr lang="en-GB" smtClean="0"/>
-              <a:t>22/04/2024</a:t>
+              <a:t>10/07/2024</a:t>
             </a:fld>
             <a:endParaRPr lang="en-GB"/>
           </a:p>
@@ -2303,7 +2303,7 @@
           <a:p>
             <a:fld id="{2E2C077B-C732-49E5-B20E-05DE29246531}" type="datetimeFigureOut">
               <a:rPr lang="en-GB" smtClean="0"/>
-              <a:t>22/04/2024</a:t>
+              <a:t>10/07/2024</a:t>
             </a:fld>
             <a:endParaRPr lang="en-GB"/>
           </a:p>
@@ -2421,7 +2421,7 @@
           <a:p>
             <a:fld id="{2E2C077B-C732-49E5-B20E-05DE29246531}" type="datetimeFigureOut">
               <a:rPr lang="en-GB" smtClean="0"/>
-              <a:t>22/04/2024</a:t>
+              <a:t>10/07/2024</a:t>
             </a:fld>
             <a:endParaRPr lang="en-GB"/>
           </a:p>
@@ -2516,7 +2516,7 @@
           <a:p>
             <a:fld id="{2E2C077B-C732-49E5-B20E-05DE29246531}" type="datetimeFigureOut">
               <a:rPr lang="en-GB" smtClean="0"/>
-              <a:t>22/04/2024</a:t>
+              <a:t>10/07/2024</a:t>
             </a:fld>
             <a:endParaRPr lang="en-GB"/>
           </a:p>
@@ -2793,7 +2793,7 @@
           <a:p>
             <a:fld id="{2E2C077B-C732-49E5-B20E-05DE29246531}" type="datetimeFigureOut">
               <a:rPr lang="en-GB" smtClean="0"/>
-              <a:t>22/04/2024</a:t>
+              <a:t>10/07/2024</a:t>
             </a:fld>
             <a:endParaRPr lang="en-GB"/>
           </a:p>
@@ -2981,7 +2981,7 @@
           <a:p>
             <a:fld id="{1041D2DD-F029-4FB0-BB12-3B6037A6356B}" type="datetimeFigureOut">
               <a:rPr lang="en-GB" smtClean="0"/>
-              <a:t>22/04/2024</a:t>
+              <a:t>10/07/2024</a:t>
             </a:fld>
             <a:endParaRPr lang="en-GB"/>
           </a:p>
@@ -3246,7 +3246,7 @@
           <a:p>
             <a:fld id="{2E2C077B-C732-49E5-B20E-05DE29246531}" type="datetimeFigureOut">
               <a:rPr lang="en-GB" smtClean="0"/>
-              <a:t>22/04/2024</a:t>
+              <a:t>10/07/2024</a:t>
             </a:fld>
             <a:endParaRPr lang="en-GB"/>
           </a:p>
@@ -3416,7 +3416,7 @@
           <a:p>
             <a:fld id="{2E2C077B-C732-49E5-B20E-05DE29246531}" type="datetimeFigureOut">
               <a:rPr lang="en-GB" smtClean="0"/>
-              <a:t>22/04/2024</a:t>
+              <a:t>10/07/2024</a:t>
             </a:fld>
             <a:endParaRPr lang="en-GB"/>
           </a:p>
@@ -3596,7 +3596,7 @@
           <a:p>
             <a:fld id="{2E2C077B-C732-49E5-B20E-05DE29246531}" type="datetimeFigureOut">
               <a:rPr lang="en-GB" smtClean="0"/>
-              <a:t>22/04/2024</a:t>
+              <a:t>10/07/2024</a:t>
             </a:fld>
             <a:endParaRPr lang="en-GB"/>
           </a:p>
@@ -3860,7 +3860,7 @@
           <a:p>
             <a:fld id="{1041D2DD-F029-4FB0-BB12-3B6037A6356B}" type="datetimeFigureOut">
               <a:rPr lang="en-GB" smtClean="0"/>
-              <a:t>22/04/2024</a:t>
+              <a:t>10/07/2024</a:t>
             </a:fld>
             <a:endParaRPr lang="en-GB"/>
           </a:p>
@@ -4128,7 +4128,7 @@
           <a:p>
             <a:fld id="{1041D2DD-F029-4FB0-BB12-3B6037A6356B}" type="datetimeFigureOut">
               <a:rPr lang="en-GB" smtClean="0"/>
-              <a:t>22/04/2024</a:t>
+              <a:t>10/07/2024</a:t>
             </a:fld>
             <a:endParaRPr lang="en-GB"/>
           </a:p>
@@ -4543,7 +4543,7 @@
           <a:p>
             <a:fld id="{1041D2DD-F029-4FB0-BB12-3B6037A6356B}" type="datetimeFigureOut">
               <a:rPr lang="en-GB" smtClean="0"/>
-              <a:t>22/04/2024</a:t>
+              <a:t>10/07/2024</a:t>
             </a:fld>
             <a:endParaRPr lang="en-GB"/>
           </a:p>
@@ -4685,7 +4685,7 @@
           <a:p>
             <a:fld id="{1041D2DD-F029-4FB0-BB12-3B6037A6356B}" type="datetimeFigureOut">
               <a:rPr lang="en-GB" smtClean="0"/>
-              <a:t>22/04/2024</a:t>
+              <a:t>10/07/2024</a:t>
             </a:fld>
             <a:endParaRPr lang="en-GB"/>
           </a:p>
@@ -4798,7 +4798,7 @@
           <a:p>
             <a:fld id="{1041D2DD-F029-4FB0-BB12-3B6037A6356B}" type="datetimeFigureOut">
               <a:rPr lang="en-GB" smtClean="0"/>
-              <a:t>22/04/2024</a:t>
+              <a:t>10/07/2024</a:t>
             </a:fld>
             <a:endParaRPr lang="en-GB"/>
           </a:p>
@@ -5111,7 +5111,7 @@
           <a:p>
             <a:fld id="{1041D2DD-F029-4FB0-BB12-3B6037A6356B}" type="datetimeFigureOut">
               <a:rPr lang="en-GB" smtClean="0"/>
-              <a:t>22/04/2024</a:t>
+              <a:t>10/07/2024</a:t>
             </a:fld>
             <a:endParaRPr lang="en-GB"/>
           </a:p>
@@ -5400,7 +5400,7 @@
           <a:p>
             <a:fld id="{1041D2DD-F029-4FB0-BB12-3B6037A6356B}" type="datetimeFigureOut">
               <a:rPr lang="en-GB" smtClean="0"/>
-              <a:t>22/04/2024</a:t>
+              <a:t>10/07/2024</a:t>
             </a:fld>
             <a:endParaRPr lang="en-GB"/>
           </a:p>
@@ -5643,7 +5643,7 @@
           <a:p>
             <a:fld id="{1041D2DD-F029-4FB0-BB12-3B6037A6356B}" type="datetimeFigureOut">
               <a:rPr lang="en-GB" smtClean="0"/>
-              <a:t>22/04/2024</a:t>
+              <a:t>10/07/2024</a:t>
             </a:fld>
             <a:endParaRPr lang="en-GB"/>
           </a:p>
@@ -6198,7 +6198,7 @@
           <a:p>
             <a:fld id="{2E2C077B-C732-49E5-B20E-05DE29246531}" type="datetimeFigureOut">
               <a:rPr lang="en-GB" smtClean="0"/>
-              <a:t>22/04/2024</a:t>
+              <a:t>10/07/2024</a:t>
             </a:fld>
             <a:endParaRPr lang="en-GB"/>
           </a:p>
@@ -6712,8 +6712,8 @@
                 <a:solidFill>
                   <a:schemeClr val="bg1"/>
                 </a:solidFill>
-                <a:latin typeface="Circular Std Book" panose="020B0604020101020102" pitchFamily="34" charset="0"/>
-                <a:cs typeface="Circular Std Book" panose="020B0604020101020102" pitchFamily="34" charset="0"/>
+                <a:latin typeface="Circular Std Book Italic" panose="020B0604020101020102" pitchFamily="34" charset="0"/>
+                <a:cs typeface="Circular Std Book Italic" panose="020B0604020101020102" pitchFamily="34" charset="0"/>
               </a:rPr>
               <a:t>CSS example</a:t>
             </a:r>
@@ -6722,8 +6722,8 @@
                 <a:solidFill>
                   <a:srgbClr val="F4C245"/>
                 </a:solidFill>
-                <a:latin typeface="Circular Std Book" panose="020B0604020101020102" pitchFamily="34" charset="0"/>
-                <a:cs typeface="Circular Std Book" panose="020B0604020101020102" pitchFamily="34" charset="0"/>
+                <a:latin typeface="Circular Std Book Italic" panose="020B0604020101020102" pitchFamily="34" charset="0"/>
+                <a:cs typeface="Circular Std Book Italic" panose="020B0604020101020102" pitchFamily="34" charset="0"/>
               </a:rPr>
               <a:t>.</a:t>
             </a:r>
@@ -6954,8 +6954,8 @@
                 <a:solidFill>
                   <a:schemeClr val="bg1"/>
                 </a:solidFill>
-                <a:latin typeface="Circular Std Book" panose="020B0604020101020102" pitchFamily="34" charset="0"/>
-                <a:cs typeface="Circular Std Book" panose="020B0604020101020102" pitchFamily="34" charset="0"/>
+                <a:latin typeface="Circular Std Book Italic" panose="020B0604020101020102" pitchFamily="34" charset="0"/>
+                <a:cs typeface="Circular Std Book Italic" panose="020B0604020101020102" pitchFamily="34" charset="0"/>
               </a:rPr>
               <a:t>Putting HTML and CSS together</a:t>
             </a:r>
@@ -6964,8 +6964,8 @@
                 <a:solidFill>
                   <a:srgbClr val="F4C245"/>
                 </a:solidFill>
-                <a:latin typeface="Circular Std Book" panose="020B0604020101020102" pitchFamily="34" charset="0"/>
-                <a:cs typeface="Circular Std Book" panose="020B0604020101020102" pitchFamily="34" charset="0"/>
+                <a:latin typeface="Circular Std Book Italic" panose="020B0604020101020102" pitchFamily="34" charset="0"/>
+                <a:cs typeface="Circular Std Book Italic" panose="020B0604020101020102" pitchFamily="34" charset="0"/>
               </a:rPr>
               <a:t>.</a:t>
             </a:r>
@@ -7007,8 +7007,8 @@
                     <a:lumMod val="95000"/>
                   </a:schemeClr>
                 </a:solidFill>
-                <a:latin typeface="Circular Std Book" panose="020B0604020101020102" pitchFamily="34" charset="0"/>
-                <a:cs typeface="Circular Std Book" panose="020B0604020101020102" pitchFamily="34" charset="0"/>
+                <a:latin typeface="Circular Std Book Italic" panose="020B0604020101020102" pitchFamily="34" charset="0"/>
+                <a:cs typeface="Circular Std Book Italic" panose="020B0604020101020102" pitchFamily="34" charset="0"/>
               </a:rPr>
               <a:t>To link an HTML page to a CSS file you specify the location in the head section of your page. </a:t>
             </a:r>
@@ -7017,8 +7017,8 @@
                 <a:solidFill>
                   <a:srgbClr val="0063AF"/>
                 </a:solidFill>
-                <a:latin typeface="Circular Std Book" panose="020B0604020101020102" pitchFamily="34" charset="0"/>
-                <a:cs typeface="Circular Std Book" panose="020B0604020101020102" pitchFamily="34" charset="0"/>
+                <a:latin typeface="Circular Std Book Italic" panose="020B0604020101020102" pitchFamily="34" charset="0"/>
+                <a:cs typeface="Circular Std Book Italic" panose="020B0604020101020102" pitchFamily="34" charset="0"/>
               </a:rPr>
             </a:br>
             <a:br>
@@ -7026,8 +7026,8 @@
                 <a:solidFill>
                   <a:srgbClr val="0063AF"/>
                 </a:solidFill>
-                <a:latin typeface="Circular Std Book" panose="020B0604020101020102" pitchFamily="34" charset="0"/>
-                <a:cs typeface="Circular Std Book" panose="020B0604020101020102" pitchFamily="34" charset="0"/>
+                <a:latin typeface="Circular Std Book Italic" panose="020B0604020101020102" pitchFamily="34" charset="0"/>
+                <a:cs typeface="Circular Std Book Italic" panose="020B0604020101020102" pitchFamily="34" charset="0"/>
               </a:rPr>
             </a:br>
             <a:r>
@@ -7388,8 +7388,8 @@
                     <a:lumMod val="95000"/>
                   </a:schemeClr>
                 </a:solidFill>
-                <a:latin typeface="Circular Std Book" panose="020B0604020101020102" pitchFamily="34" charset="0"/>
-                <a:cs typeface="Circular Std Book" panose="020B0604020101020102" pitchFamily="34" charset="0"/>
+                <a:latin typeface="Circular Std Book Italic" panose="020B0604020101020102" pitchFamily="34" charset="0"/>
+                <a:cs typeface="Circular Std Book Italic" panose="020B0604020101020102" pitchFamily="34" charset="0"/>
               </a:rPr>
               <a:t>The</a:t>
             </a:r>
@@ -7401,8 +7401,8 @@
                   </a:schemeClr>
                 </a:solidFill>
                 <a:effectLst/>
-                <a:latin typeface="Circular Std Book" panose="020B0604020101020102" pitchFamily="34" charset="0"/>
-                <a:cs typeface="Circular Std Book" panose="020B0604020101020102" pitchFamily="34" charset="0"/>
+                <a:latin typeface="Circular Std Book Italic" panose="020B0604020101020102" pitchFamily="34" charset="0"/>
+                <a:cs typeface="Circular Std Book Italic" panose="020B0604020101020102" pitchFamily="34" charset="0"/>
               </a:rPr>
               <a:t> page w</a:t>
             </a:r>
@@ -7413,8 +7413,8 @@
                     <a:lumMod val="95000"/>
                   </a:schemeClr>
                 </a:solidFill>
-                <a:latin typeface="Circular Std Book" panose="020B0604020101020102" pitchFamily="34" charset="0"/>
-                <a:cs typeface="Circular Std Book" panose="020B0604020101020102" pitchFamily="34" charset="0"/>
+                <a:latin typeface="Circular Std Book Italic" panose="020B0604020101020102" pitchFamily="34" charset="0"/>
+                <a:cs typeface="Circular Std Book Italic" panose="020B0604020101020102" pitchFamily="34" charset="0"/>
               </a:rPr>
               <a:t>ill now have the styles set out in the CSS file. </a:t>
             </a:r>
@@ -7502,8 +7502,8 @@
                 <a:solidFill>
                   <a:schemeClr val="bg1"/>
                 </a:solidFill>
-                <a:latin typeface="Circular Std Book" panose="020B0604020101020102" pitchFamily="34" charset="0"/>
-                <a:cs typeface="Circular Std Book" panose="020B0604020101020102" pitchFamily="34" charset="0"/>
+                <a:latin typeface="Circular Std Book Italic" panose="020B0604020101020102" pitchFamily="34" charset="0"/>
+                <a:cs typeface="Circular Std Book Italic" panose="020B0604020101020102" pitchFamily="34" charset="0"/>
               </a:rPr>
               <a:t>JavaScript</a:t>
             </a:r>
@@ -7512,8 +7512,8 @@
                 <a:solidFill>
                   <a:srgbClr val="F4C245"/>
                 </a:solidFill>
-                <a:latin typeface="Circular Std Book" panose="020B0604020101020102" pitchFamily="34" charset="0"/>
-                <a:cs typeface="Circular Std Book" panose="020B0604020101020102" pitchFamily="34" charset="0"/>
+                <a:latin typeface="Circular Std Book Italic" panose="020B0604020101020102" pitchFamily="34" charset="0"/>
+                <a:cs typeface="Circular Std Book Italic" panose="020B0604020101020102" pitchFamily="34" charset="0"/>
               </a:rPr>
               <a:t>.</a:t>
             </a:r>
@@ -7558,8 +7558,8 @@
                 <a:solidFill>
                   <a:srgbClr val="36B7B4"/>
                 </a:solidFill>
-                <a:latin typeface="Circular Std Book" panose="020B0604020101020102" pitchFamily="34" charset="0"/>
-                <a:cs typeface="Circular Std Book" panose="020B0604020101020102" pitchFamily="34" charset="0"/>
+                <a:latin typeface="Circular Std Book Italic" panose="020B0604020101020102" pitchFamily="34" charset="0"/>
+                <a:cs typeface="Circular Std Book Italic" panose="020B0604020101020102" pitchFamily="34" charset="0"/>
               </a:rPr>
               <a:t>History</a:t>
             </a:r>
@@ -7568,8 +7568,8 @@
                 <a:solidFill>
                   <a:schemeClr val="bg1"/>
                 </a:solidFill>
-                <a:latin typeface="Circular Std Book" panose="020B0604020101020102" pitchFamily="34" charset="0"/>
-                <a:cs typeface="Circular Std Book" panose="020B0604020101020102" pitchFamily="34" charset="0"/>
+                <a:latin typeface="Circular Std Book Italic" panose="020B0604020101020102" pitchFamily="34" charset="0"/>
+                <a:cs typeface="Circular Std Book Italic" panose="020B0604020101020102" pitchFamily="34" charset="0"/>
               </a:rPr>
               <a:t>.</a:t>
             </a:r>
@@ -7578,8 +7578,8 @@
                 <a:solidFill>
                   <a:srgbClr val="36B7B4"/>
                 </a:solidFill>
-                <a:latin typeface="Circular Std Book" panose="020B0604020101020102" pitchFamily="34" charset="0"/>
-                <a:cs typeface="Circular Std Book" panose="020B0604020101020102" pitchFamily="34" charset="0"/>
+                <a:latin typeface="Circular Std Book Italic" panose="020B0604020101020102" pitchFamily="34" charset="0"/>
+                <a:cs typeface="Circular Std Book Italic" panose="020B0604020101020102" pitchFamily="34" charset="0"/>
               </a:rPr>
               <a:t> </a:t>
             </a:r>
@@ -7588,8 +7588,8 @@
                 <a:solidFill>
                   <a:schemeClr val="bg1"/>
                 </a:solidFill>
-                <a:latin typeface="Circular Std Book" panose="020B0604020101020102" pitchFamily="34" charset="0"/>
-                <a:cs typeface="Circular Std Book" panose="020B0604020101020102" pitchFamily="34" charset="0"/>
+                <a:latin typeface="Circular Std Book Italic" panose="020B0604020101020102" pitchFamily="34" charset="0"/>
+                <a:cs typeface="Circular Std Book Italic" panose="020B0604020101020102" pitchFamily="34" charset="0"/>
               </a:rPr>
               <a:t>JS launched by Netscape in 1995. Key developer was </a:t>
             </a:r>
@@ -7598,8 +7598,8 @@
                 <a:solidFill>
                   <a:srgbClr val="36B7B4"/>
                 </a:solidFill>
-                <a:latin typeface="Circular Std Book" panose="020B0604020101020102" pitchFamily="34" charset="0"/>
-                <a:cs typeface="Circular Std Book" panose="020B0604020101020102" pitchFamily="34" charset="0"/>
+                <a:latin typeface="Circular Std Book Italic" panose="020B0604020101020102" pitchFamily="34" charset="0"/>
+                <a:cs typeface="Circular Std Book Italic" panose="020B0604020101020102" pitchFamily="34" charset="0"/>
               </a:rPr>
               <a:t>Brendan </a:t>
             </a:r>
@@ -7608,8 +7608,8 @@
                 <a:solidFill>
                   <a:srgbClr val="36B7B4"/>
                 </a:solidFill>
-                <a:latin typeface="Circular Std Book" panose="020B0604020101020102" pitchFamily="34" charset="0"/>
-                <a:cs typeface="Circular Std Book" panose="020B0604020101020102" pitchFamily="34" charset="0"/>
+                <a:latin typeface="Circular Std Book Italic" panose="020B0604020101020102" pitchFamily="34" charset="0"/>
+                <a:cs typeface="Circular Std Book Italic" panose="020B0604020101020102" pitchFamily="34" charset="0"/>
               </a:rPr>
               <a:t>Eich</a:t>
             </a:r>
@@ -7618,8 +7618,8 @@
                 <a:solidFill>
                   <a:srgbClr val="36B7B4"/>
                 </a:solidFill>
-                <a:latin typeface="Circular Std Book" panose="020B0604020101020102" pitchFamily="34" charset="0"/>
-                <a:cs typeface="Circular Std Book" panose="020B0604020101020102" pitchFamily="34" charset="0"/>
+                <a:latin typeface="Circular Std Book Italic" panose="020B0604020101020102" pitchFamily="34" charset="0"/>
+                <a:cs typeface="Circular Std Book Italic" panose="020B0604020101020102" pitchFamily="34" charset="0"/>
               </a:rPr>
               <a:t>. </a:t>
             </a:r>
@@ -7628,8 +7628,8 @@
                 <a:solidFill>
                   <a:schemeClr val="bg1"/>
                 </a:solidFill>
-                <a:latin typeface="Circular Std Book" panose="020B0604020101020102" pitchFamily="34" charset="0"/>
-                <a:cs typeface="Circular Std Book" panose="020B0604020101020102" pitchFamily="34" charset="0"/>
+                <a:latin typeface="Circular Std Book Italic" panose="020B0604020101020102" pitchFamily="34" charset="0"/>
+                <a:cs typeface="Circular Std Book Italic" panose="020B0604020101020102" pitchFamily="34" charset="0"/>
               </a:rPr>
               <a:t>Brief war with Microsoft before widespread adoption. Now used in almost all (&gt;95%) of web sites.</a:t>
             </a:r>
@@ -7645,8 +7645,8 @@
                 <a:solidFill>
                   <a:srgbClr val="36B7B4"/>
                 </a:solidFill>
-                <a:latin typeface="Circular Std Book" panose="020B0604020101020102" pitchFamily="34" charset="0"/>
-                <a:cs typeface="Circular Std Book" panose="020B0604020101020102" pitchFamily="34" charset="0"/>
+                <a:latin typeface="Circular Std Book Italic" panose="020B0604020101020102" pitchFamily="34" charset="0"/>
+                <a:cs typeface="Circular Std Book Italic" panose="020B0604020101020102" pitchFamily="34" charset="0"/>
               </a:rPr>
               <a:t>In Data Science.</a:t>
             </a:r>
@@ -7655,8 +7655,8 @@
                 <a:solidFill>
                   <a:schemeClr val="bg1"/>
                 </a:solidFill>
-                <a:latin typeface="Circular Std Book" panose="020B0604020101020102" pitchFamily="34" charset="0"/>
-                <a:cs typeface="Circular Std Book" panose="020B0604020101020102" pitchFamily="34" charset="0"/>
+                <a:latin typeface="Circular Std Book Italic" panose="020B0604020101020102" pitchFamily="34" charset="0"/>
+                <a:cs typeface="Circular Std Book Italic" panose="020B0604020101020102" pitchFamily="34" charset="0"/>
               </a:rPr>
               <a:t> Some uses of JS.</a:t>
             </a:r>
@@ -7672,8 +7672,8 @@
                 <a:solidFill>
                   <a:srgbClr val="36B7B4"/>
                 </a:solidFill>
-                <a:latin typeface="Circular Std Book" panose="020B0604020101020102" pitchFamily="34" charset="0"/>
-                <a:cs typeface="Circular Std Book" panose="020B0604020101020102" pitchFamily="34" charset="0"/>
+                <a:latin typeface="Circular Std Book Italic" panose="020B0604020101020102" pitchFamily="34" charset="0"/>
+                <a:cs typeface="Circular Std Book Italic" panose="020B0604020101020102" pitchFamily="34" charset="0"/>
               </a:rPr>
               <a:t>Fetching data</a:t>
             </a:r>
@@ -7682,8 +7682,8 @@
                 <a:solidFill>
                   <a:schemeClr val="bg1"/>
                 </a:solidFill>
-                <a:latin typeface="Circular Std Book" panose="020B0604020101020102" pitchFamily="34" charset="0"/>
-                <a:cs typeface="Circular Std Book" panose="020B0604020101020102" pitchFamily="34" charset="0"/>
+                <a:latin typeface="Circular Std Book Italic" panose="020B0604020101020102" pitchFamily="34" charset="0"/>
+                <a:cs typeface="Circular Std Book Italic" panose="020B0604020101020102" pitchFamily="34" charset="0"/>
               </a:rPr>
               <a:t>. Grab data from another site, via an API, when you open your page. </a:t>
             </a:r>
@@ -7699,8 +7699,8 @@
                 <a:solidFill>
                   <a:srgbClr val="36B7B4"/>
                 </a:solidFill>
-                <a:latin typeface="Circular Std Book" panose="020B0604020101020102" pitchFamily="34" charset="0"/>
-                <a:cs typeface="Circular Std Book" panose="020B0604020101020102" pitchFamily="34" charset="0"/>
+                <a:latin typeface="Circular Std Book Italic" panose="020B0604020101020102" pitchFamily="34" charset="0"/>
+                <a:cs typeface="Circular Std Book Italic" panose="020B0604020101020102" pitchFamily="34" charset="0"/>
               </a:rPr>
               <a:t>Cleaning and manipulating data</a:t>
             </a:r>
@@ -7709,8 +7709,8 @@
                 <a:solidFill>
                   <a:schemeClr val="bg1"/>
                 </a:solidFill>
-                <a:latin typeface="Circular Std Book" panose="020B0604020101020102" pitchFamily="34" charset="0"/>
-                <a:cs typeface="Circular Std Book" panose="020B0604020101020102" pitchFamily="34" charset="0"/>
+                <a:latin typeface="Circular Std Book Italic" panose="020B0604020101020102" pitchFamily="34" charset="0"/>
+                <a:cs typeface="Circular Std Book Italic" panose="020B0604020101020102" pitchFamily="34" charset="0"/>
               </a:rPr>
               <a:t>. Prepare and analyse the data for use in a chart or table. </a:t>
             </a:r>
@@ -7726,8 +7726,8 @@
                 <a:solidFill>
                   <a:srgbClr val="36B7B4"/>
                 </a:solidFill>
-                <a:latin typeface="Circular Std Book" panose="020B0604020101020102" pitchFamily="34" charset="0"/>
-                <a:cs typeface="Circular Std Book" panose="020B0604020101020102" pitchFamily="34" charset="0"/>
+                <a:latin typeface="Circular Std Book Italic" panose="020B0604020101020102" pitchFamily="34" charset="0"/>
+                <a:cs typeface="Circular Std Book Italic" panose="020B0604020101020102" pitchFamily="34" charset="0"/>
               </a:rPr>
               <a:t>Visualising data</a:t>
             </a:r>
@@ -7736,8 +7736,8 @@
                 <a:solidFill>
                   <a:schemeClr val="bg1"/>
                 </a:solidFill>
-                <a:latin typeface="Circular Std Book" panose="020B0604020101020102" pitchFamily="34" charset="0"/>
-                <a:cs typeface="Circular Std Book" panose="020B0604020101020102" pitchFamily="34" charset="0"/>
+                <a:latin typeface="Circular Std Book Italic" panose="020B0604020101020102" pitchFamily="34" charset="0"/>
+                <a:cs typeface="Circular Std Book Italic" panose="020B0604020101020102" pitchFamily="34" charset="0"/>
               </a:rPr>
               <a:t>.</a:t>
             </a:r>
@@ -7746,8 +7746,8 @@
                 <a:solidFill>
                   <a:srgbClr val="36B7B4"/>
                 </a:solidFill>
-                <a:latin typeface="Circular Std Book" panose="020B0604020101020102" pitchFamily="34" charset="0"/>
-                <a:cs typeface="Circular Std Book" panose="020B0604020101020102" pitchFamily="34" charset="0"/>
+                <a:latin typeface="Circular Std Book Italic" panose="020B0604020101020102" pitchFamily="34" charset="0"/>
+                <a:cs typeface="Circular Std Book Italic" panose="020B0604020101020102" pitchFamily="34" charset="0"/>
               </a:rPr>
               <a:t> </a:t>
             </a:r>
@@ -7756,8 +7756,8 @@
                 <a:solidFill>
                   <a:schemeClr val="bg1"/>
                 </a:solidFill>
-                <a:latin typeface="Circular Std Book" panose="020B0604020101020102" pitchFamily="34" charset="0"/>
-                <a:cs typeface="Circular Std Book" panose="020B0604020101020102" pitchFamily="34" charset="0"/>
+                <a:latin typeface="Circular Std Book Italic" panose="020B0604020101020102" pitchFamily="34" charset="0"/>
+                <a:cs typeface="Circular Std Book Italic" panose="020B0604020101020102" pitchFamily="34" charset="0"/>
               </a:rPr>
               <a:t>Display the data in a way you wish. There are lots of charting “libraries” that do this. For example, Vega Lite and Charts.js. </a:t>
             </a:r>
@@ -7773,8 +7773,8 @@
                 <a:solidFill>
                   <a:srgbClr val="36B7B4"/>
                 </a:solidFill>
-                <a:latin typeface="Circular Std Book" panose="020B0604020101020102" pitchFamily="34" charset="0"/>
-                <a:cs typeface="Circular Std Book" panose="020B0604020101020102" pitchFamily="34" charset="0"/>
+                <a:latin typeface="Circular Std Book Italic" panose="020B0604020101020102" pitchFamily="34" charset="0"/>
+                <a:cs typeface="Circular Std Book Italic" panose="020B0604020101020102" pitchFamily="34" charset="0"/>
               </a:rPr>
               <a:t>Interactivity</a:t>
             </a:r>
@@ -7783,8 +7783,8 @@
                 <a:solidFill>
                   <a:schemeClr val="bg1"/>
                 </a:solidFill>
-                <a:latin typeface="Circular Std Book" panose="020B0604020101020102" pitchFamily="34" charset="0"/>
-                <a:cs typeface="Circular Std Book" panose="020B0604020101020102" pitchFamily="34" charset="0"/>
+                <a:latin typeface="Circular Std Book Italic" panose="020B0604020101020102" pitchFamily="34" charset="0"/>
+                <a:cs typeface="Circular Std Book Italic" panose="020B0604020101020102" pitchFamily="34" charset="0"/>
               </a:rPr>
               <a:t>. Make visualisations interactive + sites fun and engaging. </a:t>
             </a:r>
@@ -7799,8 +7799,8 @@
               <a:solidFill>
                 <a:schemeClr val="bg1"/>
               </a:solidFill>
-              <a:latin typeface="Circular Std Book" panose="020B0604020101020102" pitchFamily="34" charset="0"/>
-              <a:cs typeface="Circular Std Book" panose="020B0604020101020102" pitchFamily="34" charset="0"/>
+              <a:latin typeface="Circular Std Book Italic" panose="020B0604020101020102" pitchFamily="34" charset="0"/>
+              <a:cs typeface="Circular Std Book Italic" panose="020B0604020101020102" pitchFamily="34" charset="0"/>
             </a:endParaRPr>
           </a:p>
           <a:p>
@@ -7813,8 +7813,8 @@
               <a:solidFill>
                 <a:srgbClr val="36B7B4"/>
               </a:solidFill>
-              <a:latin typeface="Circular Std Book" panose="020B0604020101020102" pitchFamily="34" charset="0"/>
-              <a:cs typeface="Circular Std Book" panose="020B0604020101020102" pitchFamily="34" charset="0"/>
+              <a:latin typeface="Circular Std Book Italic" panose="020B0604020101020102" pitchFamily="34" charset="0"/>
+              <a:cs typeface="Circular Std Book Italic" panose="020B0604020101020102" pitchFamily="34" charset="0"/>
             </a:endParaRPr>
           </a:p>
           <a:p>
@@ -7827,8 +7827,8 @@
               <a:solidFill>
                 <a:schemeClr val="bg1"/>
               </a:solidFill>
-              <a:latin typeface="Circular Std Book" panose="020B0604020101020102" pitchFamily="34" charset="0"/>
-              <a:cs typeface="Circular Std Book" panose="020B0604020101020102" pitchFamily="34" charset="0"/>
+              <a:latin typeface="Circular Std Book Italic" panose="020B0604020101020102" pitchFamily="34" charset="0"/>
+              <a:cs typeface="Circular Std Book Italic" panose="020B0604020101020102" pitchFamily="34" charset="0"/>
             </a:endParaRPr>
           </a:p>
           <a:p>
@@ -7841,8 +7841,8 @@
               <a:solidFill>
                 <a:srgbClr val="0063AF"/>
               </a:solidFill>
-              <a:latin typeface="Circular Std Book" panose="020B0604020101020102" pitchFamily="34" charset="0"/>
-              <a:cs typeface="Circular Std Book" panose="020B0604020101020102" pitchFamily="34" charset="0"/>
+              <a:latin typeface="Circular Std Book Italic" panose="020B0604020101020102" pitchFamily="34" charset="0"/>
+              <a:cs typeface="Circular Std Book Italic" panose="020B0604020101020102" pitchFamily="34" charset="0"/>
             </a:endParaRPr>
           </a:p>
         </p:txBody>
@@ -7927,8 +7927,8 @@
                 <a:solidFill>
                   <a:schemeClr val="bg1"/>
                 </a:solidFill>
-                <a:latin typeface="Circular Std Book" panose="020B0604020101020102" pitchFamily="34" charset="0"/>
-                <a:cs typeface="Circular Std Book" panose="020B0604020101020102" pitchFamily="34" charset="0"/>
+                <a:latin typeface="Circular Std Book Italic" panose="020B0604020101020102" pitchFamily="34" charset="0"/>
+                <a:cs typeface="Circular Std Book Italic" panose="020B0604020101020102" pitchFamily="34" charset="0"/>
               </a:rPr>
               <a:t>JavaScript example</a:t>
             </a:r>
@@ -7937,8 +7937,8 @@
                 <a:solidFill>
                   <a:srgbClr val="F4C245"/>
                 </a:solidFill>
-                <a:latin typeface="Circular Std Book" panose="020B0604020101020102" pitchFamily="34" charset="0"/>
-                <a:cs typeface="Circular Std Book" panose="020B0604020101020102" pitchFamily="34" charset="0"/>
+                <a:latin typeface="Circular Std Book Italic" panose="020B0604020101020102" pitchFamily="34" charset="0"/>
+                <a:cs typeface="Circular Std Book Italic" panose="020B0604020101020102" pitchFamily="34" charset="0"/>
               </a:rPr>
               <a:t>.</a:t>
             </a:r>
@@ -9378,8 +9378,8 @@
                 <a:solidFill>
                   <a:schemeClr val="bg1"/>
                 </a:solidFill>
-                <a:latin typeface="Circular Std Book" panose="020B0604020101020102" pitchFamily="34" charset="0"/>
-                <a:cs typeface="Circular Std Book" panose="020B0604020101020102" pitchFamily="34" charset="0"/>
+                <a:latin typeface="Circular Std Book Italic" panose="020B0604020101020102" pitchFamily="34" charset="0"/>
+                <a:cs typeface="Circular Std Book Italic" panose="020B0604020101020102" pitchFamily="34" charset="0"/>
               </a:rPr>
               <a:t>JavaScript example</a:t>
             </a:r>
@@ -9388,8 +9388,8 @@
                 <a:solidFill>
                   <a:srgbClr val="F4C245"/>
                 </a:solidFill>
-                <a:latin typeface="Circular Std Book" panose="020B0604020101020102" pitchFamily="34" charset="0"/>
-                <a:cs typeface="Circular Std Book" panose="020B0604020101020102" pitchFamily="34" charset="0"/>
+                <a:latin typeface="Circular Std Book Italic" panose="020B0604020101020102" pitchFamily="34" charset="0"/>
+                <a:cs typeface="Circular Std Book Italic" panose="020B0604020101020102" pitchFamily="34" charset="0"/>
               </a:rPr>
               <a:t>.</a:t>
             </a:r>
@@ -11024,8 +11024,8 @@
                 <a:solidFill>
                   <a:schemeClr val="bg1"/>
                 </a:solidFill>
-                <a:latin typeface="Circular Std Book" panose="020B0604020101020102" pitchFamily="34" charset="0"/>
-                <a:cs typeface="Circular Std Book" panose="020B0604020101020102" pitchFamily="34" charset="0"/>
+                <a:latin typeface="Circular Std Book Italic" panose="020B0604020101020102" pitchFamily="34" charset="0"/>
+                <a:cs typeface="Circular Std Book Italic" panose="020B0604020101020102" pitchFamily="34" charset="0"/>
               </a:rPr>
               <a:t>Session 2</a:t>
             </a:r>
@@ -11034,8 +11034,8 @@
                 <a:solidFill>
                   <a:srgbClr val="F4C245"/>
                 </a:solidFill>
-                <a:latin typeface="Circular Std Book" panose="020B0604020101020102" pitchFamily="34" charset="0"/>
-                <a:cs typeface="Circular Std Book" panose="020B0604020101020102" pitchFamily="34" charset="0"/>
+                <a:latin typeface="Circular Std Book Italic" panose="020B0604020101020102" pitchFamily="34" charset="0"/>
+                <a:cs typeface="Circular Std Book Italic" panose="020B0604020101020102" pitchFamily="34" charset="0"/>
               </a:rPr>
               <a:t>.</a:t>
             </a:r>
@@ -11044,8 +11044,8 @@
                 <a:solidFill>
                   <a:srgbClr val="36B7B4"/>
                 </a:solidFill>
-                <a:latin typeface="Circular Std Book" panose="020B0604020101020102" pitchFamily="34" charset="0"/>
-                <a:cs typeface="Circular Std Book" panose="020B0604020101020102" pitchFamily="34" charset="0"/>
+                <a:latin typeface="Circular Std Book Italic" panose="020B0604020101020102" pitchFamily="34" charset="0"/>
+                <a:cs typeface="Circular Std Book Italic" panose="020B0604020101020102" pitchFamily="34" charset="0"/>
               </a:rPr>
             </a:br>
             <a:r>
@@ -11274,8 +11274,8 @@
                 <a:solidFill>
                   <a:schemeClr val="bg1"/>
                 </a:solidFill>
-                <a:latin typeface="Circular Std Book" panose="020B0604020101020102" pitchFamily="34" charset="0"/>
-                <a:cs typeface="Circular Std Book" panose="020B0604020101020102" pitchFamily="34" charset="0"/>
+                <a:latin typeface="Circular Std Book Italic" panose="020B0604020101020102" pitchFamily="34" charset="0"/>
+                <a:cs typeface="Circular Std Book Italic" panose="020B0604020101020102" pitchFamily="34" charset="0"/>
               </a:rPr>
               <a:t>Session 2</a:t>
             </a:r>
@@ -11284,8 +11284,8 @@
                 <a:solidFill>
                   <a:srgbClr val="36B7B4"/>
                 </a:solidFill>
-                <a:latin typeface="Circular Std Book" panose="020B0604020101020102" pitchFamily="34" charset="0"/>
-                <a:cs typeface="Circular Std Book" panose="020B0604020101020102" pitchFamily="34" charset="0"/>
+                <a:latin typeface="Circular Std Book Italic" panose="020B0604020101020102" pitchFamily="34" charset="0"/>
+                <a:cs typeface="Circular Std Book Italic" panose="020B0604020101020102" pitchFamily="34" charset="0"/>
               </a:rPr>
               <a:t>.</a:t>
             </a:r>
@@ -11294,8 +11294,8 @@
                 <a:solidFill>
                   <a:srgbClr val="36B7B4"/>
                 </a:solidFill>
-                <a:latin typeface="Circular Std Book" panose="020B0604020101020102" pitchFamily="34" charset="0"/>
-                <a:cs typeface="Circular Std Book" panose="020B0604020101020102" pitchFamily="34" charset="0"/>
+                <a:latin typeface="Circular Std Book Italic" panose="020B0604020101020102" pitchFamily="34" charset="0"/>
+                <a:cs typeface="Circular Std Book Italic" panose="020B0604020101020102" pitchFamily="34" charset="0"/>
               </a:rPr>
             </a:br>
             <a:r>
@@ -11538,8 +11538,8 @@
                 <a:solidFill>
                   <a:schemeClr val="bg1"/>
                 </a:solidFill>
-                <a:latin typeface="Circular Std Book" panose="020B0604020101020102" pitchFamily="34" charset="0"/>
-                <a:cs typeface="Circular Std Book" panose="020B0604020101020102" pitchFamily="34" charset="0"/>
+                <a:latin typeface="Circular Std Book Italic" panose="020B0604020101020102" pitchFamily="34" charset="0"/>
+                <a:cs typeface="Circular Std Book Italic" panose="020B0604020101020102" pitchFamily="34" charset="0"/>
               </a:rPr>
               <a:t>Code-along</a:t>
             </a:r>
@@ -11548,8 +11548,8 @@
                 <a:solidFill>
                   <a:srgbClr val="F4C245"/>
                 </a:solidFill>
-                <a:latin typeface="Circular Std Book" panose="020B0604020101020102" pitchFamily="34" charset="0"/>
-                <a:cs typeface="Circular Std Book" panose="020B0604020101020102" pitchFamily="34" charset="0"/>
+                <a:latin typeface="Circular Std Book Italic" panose="020B0604020101020102" pitchFamily="34" charset="0"/>
+                <a:cs typeface="Circular Std Book Italic" panose="020B0604020101020102" pitchFamily="34" charset="0"/>
               </a:rPr>
               <a:t>.</a:t>
             </a:r>
@@ -11558,8 +11558,8 @@
                 <a:solidFill>
                   <a:srgbClr val="36B7B4"/>
                 </a:solidFill>
-                <a:latin typeface="Circular Std Book" panose="020B0604020101020102" pitchFamily="34" charset="0"/>
-                <a:cs typeface="Circular Std Book" panose="020B0604020101020102" pitchFamily="34" charset="0"/>
+                <a:latin typeface="Circular Std Book Italic" panose="020B0604020101020102" pitchFamily="34" charset="0"/>
+                <a:cs typeface="Circular Std Book Italic" panose="020B0604020101020102" pitchFamily="34" charset="0"/>
               </a:rPr>
             </a:br>
             <a:endParaRPr lang="en-GB" dirty="0">
@@ -11568,8 +11568,8 @@
                   <a:lumMod val="95000"/>
                 </a:schemeClr>
               </a:solidFill>
-              <a:latin typeface="Circular Std Book" panose="020B0604020101020102" pitchFamily="34" charset="0"/>
-              <a:cs typeface="Circular Std Book" panose="020B0604020101020102" pitchFamily="34" charset="0"/>
+              <a:latin typeface="Circular Std Book Italic" panose="020B0604020101020102" pitchFamily="34" charset="0"/>
+              <a:cs typeface="Circular Std Book Italic" panose="020B0604020101020102" pitchFamily="34" charset="0"/>
             </a:endParaRPr>
           </a:p>
         </p:txBody>
@@ -11607,8 +11607,8 @@
                 <a:solidFill>
                   <a:schemeClr val="bg1"/>
                 </a:solidFill>
-                <a:latin typeface="Circular Std Book" panose="020B0604020101020102" pitchFamily="34" charset="0"/>
-                <a:cs typeface="Circular Std Book" panose="020B0604020101020102" pitchFamily="34" charset="0"/>
+                <a:latin typeface="Circular Std Book Italic" panose="020B0604020101020102" pitchFamily="34" charset="0"/>
+                <a:cs typeface="Circular Std Book Italic" panose="020B0604020101020102" pitchFamily="34" charset="0"/>
               </a:rPr>
               <a:t>In this second practical session, we will be using </a:t>
             </a:r>
@@ -11617,8 +11617,8 @@
                 <a:solidFill>
                   <a:srgbClr val="36B7B4"/>
                 </a:solidFill>
-                <a:latin typeface="Circular Std Book" panose="020B0604020101020102" pitchFamily="34" charset="0"/>
-                <a:cs typeface="Circular Std Book" panose="020B0604020101020102" pitchFamily="34" charset="0"/>
+                <a:latin typeface="Circular Std Book Italic" panose="020B0604020101020102" pitchFamily="34" charset="0"/>
+                <a:cs typeface="Circular Std Book Italic" panose="020B0604020101020102" pitchFamily="34" charset="0"/>
               </a:rPr>
               <a:t>VS Code </a:t>
             </a:r>
@@ -11627,8 +11627,8 @@
                 <a:solidFill>
                   <a:schemeClr val="bg1"/>
                 </a:solidFill>
-                <a:latin typeface="Circular Std Book" panose="020B0604020101020102" pitchFamily="34" charset="0"/>
-                <a:cs typeface="Circular Std Book" panose="020B0604020101020102" pitchFamily="34" charset="0"/>
+                <a:latin typeface="Circular Std Book Italic" panose="020B0604020101020102" pitchFamily="34" charset="0"/>
+                <a:cs typeface="Circular Std Book Italic" panose="020B0604020101020102" pitchFamily="34" charset="0"/>
               </a:rPr>
               <a:t>and </a:t>
             </a:r>
@@ -11637,8 +11637,8 @@
                 <a:solidFill>
                   <a:srgbClr val="36B7B4"/>
                 </a:solidFill>
-                <a:latin typeface="Circular Std Book" panose="020B0604020101020102" pitchFamily="34" charset="0"/>
-                <a:cs typeface="Circular Std Book" panose="020B0604020101020102" pitchFamily="34" charset="0"/>
+                <a:latin typeface="Circular Std Book Italic" panose="020B0604020101020102" pitchFamily="34" charset="0"/>
+                <a:cs typeface="Circular Std Book Italic" panose="020B0604020101020102" pitchFamily="34" charset="0"/>
               </a:rPr>
               <a:t>GitHub</a:t>
             </a:r>
@@ -11647,8 +11647,8 @@
                 <a:solidFill>
                   <a:schemeClr val="bg1"/>
                 </a:solidFill>
-                <a:latin typeface="Circular Std Book" panose="020B0604020101020102" pitchFamily="34" charset="0"/>
-                <a:cs typeface="Circular Std Book" panose="020B0604020101020102" pitchFamily="34" charset="0"/>
+                <a:latin typeface="Circular Std Book Italic" panose="020B0604020101020102" pitchFamily="34" charset="0"/>
+                <a:cs typeface="Circular Std Book Italic" panose="020B0604020101020102" pitchFamily="34" charset="0"/>
               </a:rPr>
               <a:t> to build your personal website.</a:t>
             </a:r>
@@ -11658,8 +11658,8 @@
               <a:solidFill>
                 <a:schemeClr val="bg1"/>
               </a:solidFill>
-              <a:latin typeface="Circular Std Book" panose="020B0604020101020102" pitchFamily="34" charset="0"/>
-              <a:cs typeface="Circular Std Book" panose="020B0604020101020102" pitchFamily="34" charset="0"/>
+              <a:latin typeface="Circular Std Book Italic" panose="020B0604020101020102" pitchFamily="34" charset="0"/>
+              <a:cs typeface="Circular Std Book Italic" panose="020B0604020101020102" pitchFamily="34" charset="0"/>
             </a:endParaRPr>
           </a:p>
           <a:p>
@@ -11672,8 +11672,8 @@
                 <a:solidFill>
                   <a:schemeClr val="bg1"/>
                 </a:solidFill>
-                <a:latin typeface="Circular Std Book" panose="020B0604020101020102" pitchFamily="34" charset="0"/>
-                <a:cs typeface="Circular Std Book" panose="020B0604020101020102" pitchFamily="34" charset="0"/>
+                <a:latin typeface="Circular Std Book Italic" panose="020B0604020101020102" pitchFamily="34" charset="0"/>
+                <a:cs typeface="Circular Std Book Italic" panose="020B0604020101020102" pitchFamily="34" charset="0"/>
               </a:rPr>
               <a:t>Edit your </a:t>
             </a:r>
@@ -11682,8 +11682,8 @@
                 <a:solidFill>
                   <a:srgbClr val="36B7B4"/>
                 </a:solidFill>
-                <a:latin typeface="Circular Std Book" panose="020B0604020101020102" pitchFamily="34" charset="0"/>
-                <a:cs typeface="Circular Std Book" panose="020B0604020101020102" pitchFamily="34" charset="0"/>
+                <a:latin typeface="Circular Std Book Italic" panose="020B0604020101020102" pitchFamily="34" charset="0"/>
+                <a:cs typeface="Circular Std Book Italic" panose="020B0604020101020102" pitchFamily="34" charset="0"/>
               </a:rPr>
               <a:t>HTML </a:t>
             </a:r>
@@ -11692,8 +11692,8 @@
                 <a:solidFill>
                   <a:schemeClr val="bg1"/>
                 </a:solidFill>
-                <a:latin typeface="Circular Std Book" panose="020B0604020101020102" pitchFamily="34" charset="0"/>
-                <a:cs typeface="Circular Std Book" panose="020B0604020101020102" pitchFamily="34" charset="0"/>
+                <a:latin typeface="Circular Std Book Italic" panose="020B0604020101020102" pitchFamily="34" charset="0"/>
+                <a:cs typeface="Circular Std Book Italic" panose="020B0604020101020102" pitchFamily="34" charset="0"/>
               </a:rPr>
               <a:t>(name, bio, etc)</a:t>
             </a:r>
@@ -11708,8 +11708,8 @@
                 <a:solidFill>
                   <a:schemeClr val="bg1"/>
                 </a:solidFill>
-                <a:latin typeface="Circular Std Book" panose="020B0604020101020102" pitchFamily="34" charset="0"/>
-                <a:cs typeface="Circular Std Book" panose="020B0604020101020102" pitchFamily="34" charset="0"/>
+                <a:latin typeface="Circular Std Book Italic" panose="020B0604020101020102" pitchFamily="34" charset="0"/>
+                <a:cs typeface="Circular Std Book Italic" panose="020B0604020101020102" pitchFamily="34" charset="0"/>
               </a:rPr>
               <a:t>Add some </a:t>
             </a:r>
@@ -11718,8 +11718,8 @@
                 <a:solidFill>
                   <a:srgbClr val="36B7B4"/>
                 </a:solidFill>
-                <a:latin typeface="Circular Std Book" panose="020B0604020101020102" pitchFamily="34" charset="0"/>
-                <a:cs typeface="Circular Std Book" panose="020B0604020101020102" pitchFamily="34" charset="0"/>
+                <a:latin typeface="Circular Std Book Italic" panose="020B0604020101020102" pitchFamily="34" charset="0"/>
+                <a:cs typeface="Circular Std Book Italic" panose="020B0604020101020102" pitchFamily="34" charset="0"/>
               </a:rPr>
               <a:t>CSS </a:t>
             </a:r>
@@ -11728,8 +11728,8 @@
                 <a:solidFill>
                   <a:schemeClr val="bg1"/>
                 </a:solidFill>
-                <a:latin typeface="Circular Std Book" panose="020B0604020101020102" pitchFamily="34" charset="0"/>
-                <a:cs typeface="Circular Std Book" panose="020B0604020101020102" pitchFamily="34" charset="0"/>
+                <a:latin typeface="Circular Std Book Italic" panose="020B0604020101020102" pitchFamily="34" charset="0"/>
+                <a:cs typeface="Circular Std Book Italic" panose="020B0604020101020102" pitchFamily="34" charset="0"/>
               </a:rPr>
               <a:t>(choose colours, fonts, etc)</a:t>
             </a:r>
@@ -11744,8 +11744,8 @@
                 <a:solidFill>
                   <a:schemeClr val="bg1"/>
                 </a:solidFill>
-                <a:latin typeface="Circular Std Book" panose="020B0604020101020102" pitchFamily="34" charset="0"/>
-                <a:cs typeface="Circular Std Book" panose="020B0604020101020102" pitchFamily="34" charset="0"/>
+                <a:latin typeface="Circular Std Book Italic" panose="020B0604020101020102" pitchFamily="34" charset="0"/>
+                <a:cs typeface="Circular Std Book Italic" panose="020B0604020101020102" pitchFamily="34" charset="0"/>
               </a:rPr>
               <a:t>Embed an example </a:t>
             </a:r>
@@ -11754,8 +11754,8 @@
                 <a:solidFill>
                   <a:srgbClr val="36B7B4"/>
                 </a:solidFill>
-                <a:latin typeface="Circular Std Book" panose="020B0604020101020102" pitchFamily="34" charset="0"/>
-                <a:cs typeface="Circular Std Book" panose="020B0604020101020102" pitchFamily="34" charset="0"/>
+                <a:latin typeface="Circular Std Book Italic" panose="020B0604020101020102" pitchFamily="34" charset="0"/>
+                <a:cs typeface="Circular Std Book Italic" panose="020B0604020101020102" pitchFamily="34" charset="0"/>
               </a:rPr>
               <a:t>JSON</a:t>
             </a:r>
@@ -11764,8 +11764,8 @@
                 <a:solidFill>
                   <a:schemeClr val="bg1"/>
                 </a:solidFill>
-                <a:latin typeface="Circular Std Book" panose="020B0604020101020102" pitchFamily="34" charset="0"/>
-                <a:cs typeface="Circular Std Book" panose="020B0604020101020102" pitchFamily="34" charset="0"/>
+                <a:latin typeface="Circular Std Book Italic" panose="020B0604020101020102" pitchFamily="34" charset="0"/>
+                <a:cs typeface="Circular Std Book Italic" panose="020B0604020101020102" pitchFamily="34" charset="0"/>
               </a:rPr>
               <a:t> chart </a:t>
             </a:r>
@@ -11857,8 +11857,8 @@
                 <a:solidFill>
                   <a:schemeClr val="bg1"/>
                 </a:solidFill>
-                <a:latin typeface="Circular Std Book" panose="020B0604020101020102" pitchFamily="34" charset="0"/>
-                <a:cs typeface="Circular Std Book" panose="020B0604020101020102" pitchFamily="34" charset="0"/>
+                <a:latin typeface="Circular Std Book Italic" panose="020B0604020101020102" pitchFamily="34" charset="0"/>
+                <a:cs typeface="Circular Std Book Italic" panose="020B0604020101020102" pitchFamily="34" charset="0"/>
               </a:rPr>
               <a:t>HTML</a:t>
             </a:r>
@@ -11867,8 +11867,8 @@
                 <a:solidFill>
                   <a:srgbClr val="F4C245"/>
                 </a:solidFill>
-                <a:latin typeface="Circular Std Book" panose="020B0604020101020102" pitchFamily="34" charset="0"/>
-                <a:cs typeface="Circular Std Book" panose="020B0604020101020102" pitchFamily="34" charset="0"/>
+                <a:latin typeface="Circular Std Book Italic" panose="020B0604020101020102" pitchFamily="34" charset="0"/>
+                <a:cs typeface="Circular Std Book Italic" panose="020B0604020101020102" pitchFamily="34" charset="0"/>
               </a:rPr>
               <a:t>.</a:t>
             </a:r>
@@ -11876,8 +11876,8 @@
               <a:solidFill>
                 <a:srgbClr val="F4C245"/>
               </a:solidFill>
-              <a:latin typeface="Circular Std Book" panose="020B0604020101020102" pitchFamily="34" charset="0"/>
-              <a:cs typeface="Circular Std Book" panose="020B0604020101020102" pitchFamily="34" charset="0"/>
+              <a:latin typeface="Circular Std Book Italic" panose="020B0604020101020102" pitchFamily="34" charset="0"/>
+              <a:cs typeface="Circular Std Book Italic" panose="020B0604020101020102" pitchFamily="34" charset="0"/>
             </a:endParaRPr>
           </a:p>
         </p:txBody>
@@ -11920,8 +11920,8 @@
                 <a:solidFill>
                   <a:schemeClr val="bg1"/>
                 </a:solidFill>
-                <a:latin typeface="Circular Std Book" panose="020B0604020101020102" pitchFamily="34" charset="0"/>
-                <a:cs typeface="Circular Std Book" panose="020B0604020101020102" pitchFamily="34" charset="0"/>
+                <a:latin typeface="Circular Std Book Italic" panose="020B0604020101020102" pitchFamily="34" charset="0"/>
+                <a:cs typeface="Circular Std Book Italic" panose="020B0604020101020102" pitchFamily="34" charset="0"/>
               </a:rPr>
               <a:t>Create and edit your “</a:t>
             </a:r>
@@ -11930,8 +11930,8 @@
                 <a:solidFill>
                   <a:srgbClr val="F4C245"/>
                 </a:solidFill>
-                <a:latin typeface="Circular Std Book" panose="020B0604020101020102" pitchFamily="34" charset="0"/>
-                <a:cs typeface="Circular Std Book" panose="020B0604020101020102" pitchFamily="34" charset="0"/>
+                <a:latin typeface="Circular Std Book Italic" panose="020B0604020101020102" pitchFamily="34" charset="0"/>
+                <a:cs typeface="Circular Std Book Italic" panose="020B0604020101020102" pitchFamily="34" charset="0"/>
               </a:rPr>
               <a:t>index.html</a:t>
             </a:r>
@@ -11940,8 +11940,8 @@
                 <a:solidFill>
                   <a:schemeClr val="bg1"/>
                 </a:solidFill>
-                <a:latin typeface="Circular Std Book" panose="020B0604020101020102" pitchFamily="34" charset="0"/>
-                <a:cs typeface="Circular Std Book" panose="020B0604020101020102" pitchFamily="34" charset="0"/>
+                <a:latin typeface="Circular Std Book Italic" panose="020B0604020101020102" pitchFamily="34" charset="0"/>
+                <a:cs typeface="Circular Std Book Italic" panose="020B0604020101020102" pitchFamily="34" charset="0"/>
               </a:rPr>
               <a:t>” file</a:t>
             </a:r>
@@ -11957,8 +11957,8 @@
                 <a:solidFill>
                   <a:schemeClr val="bg1"/>
                 </a:solidFill>
-                <a:latin typeface="Circular Std Book" panose="020B0604020101020102" pitchFamily="34" charset="0"/>
-                <a:cs typeface="Circular Std Book" panose="020B0604020101020102" pitchFamily="34" charset="0"/>
+                <a:latin typeface="Circular Std Book Italic" panose="020B0604020101020102" pitchFamily="34" charset="0"/>
+                <a:cs typeface="Circular Std Book Italic" panose="020B0604020101020102" pitchFamily="34" charset="0"/>
               </a:rPr>
               <a:t>Use “</a:t>
             </a:r>
@@ -11967,8 +11967,8 @@
                 <a:solidFill>
                   <a:srgbClr val="F4C245"/>
                 </a:solidFill>
-                <a:latin typeface="Circular Std Book" panose="020B0604020101020102" pitchFamily="34" charset="0"/>
-                <a:cs typeface="Circular Std Book" panose="020B0604020101020102" pitchFamily="34" charset="0"/>
+                <a:latin typeface="Circular Std Book Italic" panose="020B0604020101020102" pitchFamily="34" charset="0"/>
+                <a:cs typeface="Circular Std Book Italic" panose="020B0604020101020102" pitchFamily="34" charset="0"/>
               </a:rPr>
               <a:t>s2_example1.html</a:t>
             </a:r>
@@ -11977,8 +11977,8 @@
                 <a:solidFill>
                   <a:schemeClr val="bg1"/>
                 </a:solidFill>
-                <a:latin typeface="Circular Std Book" panose="020B0604020101020102" pitchFamily="34" charset="0"/>
-                <a:cs typeface="Circular Std Book" panose="020B0604020101020102" pitchFamily="34" charset="0"/>
+                <a:latin typeface="Circular Std Book Italic" panose="020B0604020101020102" pitchFamily="34" charset="0"/>
+                <a:cs typeface="Circular Std Book Italic" panose="020B0604020101020102" pitchFamily="34" charset="0"/>
               </a:rPr>
               <a:t>” for inspiration</a:t>
             </a:r>
@@ -12057,8 +12057,8 @@
                 <a:solidFill>
                   <a:schemeClr val="bg1"/>
                 </a:solidFill>
-                <a:latin typeface="Circular Std Book" panose="020B0604020101020102" pitchFamily="34" charset="0"/>
-                <a:cs typeface="Circular Std Book" panose="020B0604020101020102" pitchFamily="34" charset="0"/>
+                <a:latin typeface="Circular Std Book Italic" panose="020B0604020101020102" pitchFamily="34" charset="0"/>
+                <a:cs typeface="Circular Std Book Italic" panose="020B0604020101020102" pitchFamily="34" charset="0"/>
               </a:rPr>
               <a:t>Session 2</a:t>
             </a:r>
@@ -12067,8 +12067,8 @@
                 <a:solidFill>
                   <a:srgbClr val="F4C245"/>
                 </a:solidFill>
-                <a:latin typeface="Circular Std Book" panose="020B0604020101020102" pitchFamily="34" charset="0"/>
-                <a:cs typeface="Circular Std Book" panose="020B0604020101020102" pitchFamily="34" charset="0"/>
+                <a:latin typeface="Circular Std Book Italic" panose="020B0604020101020102" pitchFamily="34" charset="0"/>
+                <a:cs typeface="Circular Std Book Italic" panose="020B0604020101020102" pitchFamily="34" charset="0"/>
               </a:rPr>
               <a:t>.</a:t>
             </a:r>
@@ -12077,8 +12077,8 @@
                 <a:solidFill>
                   <a:srgbClr val="36B7B4"/>
                 </a:solidFill>
-                <a:latin typeface="Circular Std Book" panose="020B0604020101020102" pitchFamily="34" charset="0"/>
-                <a:cs typeface="Circular Std Book" panose="020B0604020101020102" pitchFamily="34" charset="0"/>
+                <a:latin typeface="Circular Std Book Italic" panose="020B0604020101020102" pitchFamily="34" charset="0"/>
+                <a:cs typeface="Circular Std Book Italic" panose="020B0604020101020102" pitchFamily="34" charset="0"/>
               </a:rPr>
             </a:br>
             <a:r>
@@ -12205,8 +12205,8 @@
                 <a:solidFill>
                   <a:schemeClr val="bg1"/>
                 </a:solidFill>
-                <a:latin typeface="Circular Std Book" panose="020B0604020101020102" pitchFamily="34" charset="0"/>
-                <a:cs typeface="Circular Std Book" panose="020B0604020101020102" pitchFamily="34" charset="0"/>
+                <a:latin typeface="Circular Std Book Italic" panose="020B0604020101020102" pitchFamily="34" charset="0"/>
+                <a:cs typeface="Circular Std Book Italic" panose="020B0604020101020102" pitchFamily="34" charset="0"/>
               </a:rPr>
               <a:t>CSS</a:t>
             </a:r>
@@ -12215,8 +12215,8 @@
                 <a:solidFill>
                   <a:srgbClr val="F4C245"/>
                 </a:solidFill>
-                <a:latin typeface="Circular Std Book" panose="020B0604020101020102" pitchFamily="34" charset="0"/>
-                <a:cs typeface="Circular Std Book" panose="020B0604020101020102" pitchFamily="34" charset="0"/>
+                <a:latin typeface="Circular Std Book Italic" panose="020B0604020101020102" pitchFamily="34" charset="0"/>
+                <a:cs typeface="Circular Std Book Italic" panose="020B0604020101020102" pitchFamily="34" charset="0"/>
               </a:rPr>
               <a:t>.</a:t>
             </a:r>
@@ -12224,8 +12224,8 @@
               <a:solidFill>
                 <a:srgbClr val="F4C245"/>
               </a:solidFill>
-              <a:latin typeface="Circular Std Book" panose="020B0604020101020102" pitchFamily="34" charset="0"/>
-              <a:cs typeface="Circular Std Book" panose="020B0604020101020102" pitchFamily="34" charset="0"/>
+              <a:latin typeface="Circular Std Book Italic" panose="020B0604020101020102" pitchFamily="34" charset="0"/>
+              <a:cs typeface="Circular Std Book Italic" panose="020B0604020101020102" pitchFamily="34" charset="0"/>
             </a:endParaRPr>
           </a:p>
         </p:txBody>
@@ -12268,8 +12268,8 @@
                 <a:solidFill>
                   <a:schemeClr val="bg1"/>
                 </a:solidFill>
-                <a:latin typeface="Circular Std Book" panose="020B0604020101020102" pitchFamily="34" charset="0"/>
-                <a:cs typeface="Circular Std Book" panose="020B0604020101020102" pitchFamily="34" charset="0"/>
+                <a:latin typeface="Circular Std Book Italic" panose="020B0604020101020102" pitchFamily="34" charset="0"/>
+                <a:cs typeface="Circular Std Book Italic" panose="020B0604020101020102" pitchFamily="34" charset="0"/>
               </a:rPr>
               <a:t>Edit your </a:t>
             </a:r>
@@ -12278,8 +12278,8 @@
                 <a:solidFill>
                   <a:srgbClr val="F4C245"/>
                 </a:solidFill>
-                <a:latin typeface="Circular Std Book" panose="020B0604020101020102" pitchFamily="34" charset="0"/>
-                <a:cs typeface="Circular Std Book" panose="020B0604020101020102" pitchFamily="34" charset="0"/>
+                <a:latin typeface="Circular Std Book Italic" panose="020B0604020101020102" pitchFamily="34" charset="0"/>
+                <a:cs typeface="Circular Std Book Italic" panose="020B0604020101020102" pitchFamily="34" charset="0"/>
               </a:rPr>
               <a:t>CSS </a:t>
             </a:r>
@@ -12288,8 +12288,8 @@
                 <a:solidFill>
                   <a:schemeClr val="bg1"/>
                 </a:solidFill>
-                <a:latin typeface="Circular Std Book" panose="020B0604020101020102" pitchFamily="34" charset="0"/>
-                <a:cs typeface="Circular Std Book" panose="020B0604020101020102" pitchFamily="34" charset="0"/>
+                <a:latin typeface="Circular Std Book Italic" panose="020B0604020101020102" pitchFamily="34" charset="0"/>
+                <a:cs typeface="Circular Std Book Italic" panose="020B0604020101020102" pitchFamily="34" charset="0"/>
               </a:rPr>
               <a:t>file</a:t>
             </a:r>
@@ -12305,8 +12305,8 @@
                 <a:solidFill>
                   <a:schemeClr val="bg1"/>
                 </a:solidFill>
-                <a:latin typeface="Circular Std Book" panose="020B0604020101020102" pitchFamily="34" charset="0"/>
-                <a:cs typeface="Circular Std Book" panose="020B0604020101020102" pitchFamily="34" charset="0"/>
+                <a:latin typeface="Circular Std Book Italic" panose="020B0604020101020102" pitchFamily="34" charset="0"/>
+                <a:cs typeface="Circular Std Book Italic" panose="020B0604020101020102" pitchFamily="34" charset="0"/>
               </a:rPr>
               <a:t>Use “</a:t>
             </a:r>
@@ -12315,8 +12315,8 @@
                 <a:solidFill>
                   <a:srgbClr val="F4C245"/>
                 </a:solidFill>
-                <a:latin typeface="Circular Std Book" panose="020B0604020101020102" pitchFamily="34" charset="0"/>
-                <a:cs typeface="Circular Std Book" panose="020B0604020101020102" pitchFamily="34" charset="0"/>
+                <a:latin typeface="Circular Std Book Italic" panose="020B0604020101020102" pitchFamily="34" charset="0"/>
+                <a:cs typeface="Circular Std Book Italic" panose="020B0604020101020102" pitchFamily="34" charset="0"/>
               </a:rPr>
               <a:t>s2_example1.css</a:t>
             </a:r>
@@ -12325,8 +12325,8 @@
                 <a:solidFill>
                   <a:schemeClr val="bg1"/>
                 </a:solidFill>
-                <a:latin typeface="Circular Std Book" panose="020B0604020101020102" pitchFamily="34" charset="0"/>
-                <a:cs typeface="Circular Std Book" panose="020B0604020101020102" pitchFamily="34" charset="0"/>
+                <a:latin typeface="Circular Std Book Italic" panose="020B0604020101020102" pitchFamily="34" charset="0"/>
+                <a:cs typeface="Circular Std Book Italic" panose="020B0604020101020102" pitchFamily="34" charset="0"/>
               </a:rPr>
               <a:t>”, “</a:t>
             </a:r>
@@ -12335,8 +12335,8 @@
                 <a:solidFill>
                   <a:srgbClr val="F4C245"/>
                 </a:solidFill>
-                <a:latin typeface="Circular Std Book" panose="020B0604020101020102" pitchFamily="34" charset="0"/>
-                <a:cs typeface="Circular Std Book" panose="020B0604020101020102" pitchFamily="34" charset="0"/>
+                <a:latin typeface="Circular Std Book Italic" panose="020B0604020101020102" pitchFamily="34" charset="0"/>
+                <a:cs typeface="Circular Std Book Italic" panose="020B0604020101020102" pitchFamily="34" charset="0"/>
               </a:rPr>
               <a:t>s2_example2.css</a:t>
             </a:r>
@@ -12345,8 +12345,8 @@
                 <a:solidFill>
                   <a:schemeClr val="bg1"/>
                 </a:solidFill>
-                <a:latin typeface="Circular Std Book" panose="020B0604020101020102" pitchFamily="34" charset="0"/>
-                <a:cs typeface="Circular Std Book" panose="020B0604020101020102" pitchFamily="34" charset="0"/>
+                <a:latin typeface="Circular Std Book Italic" panose="020B0604020101020102" pitchFamily="34" charset="0"/>
+                <a:cs typeface="Circular Std Book Italic" panose="020B0604020101020102" pitchFamily="34" charset="0"/>
               </a:rPr>
               <a:t>” or “</a:t>
             </a:r>
@@ -12355,8 +12355,8 @@
                 <a:solidFill>
                   <a:srgbClr val="F4C245"/>
                 </a:solidFill>
-                <a:latin typeface="Circular Std Book" panose="020B0604020101020102" pitchFamily="34" charset="0"/>
-                <a:cs typeface="Circular Std Book" panose="020B0604020101020102" pitchFamily="34" charset="0"/>
+                <a:latin typeface="Circular Std Book Italic" panose="020B0604020101020102" pitchFamily="34" charset="0"/>
+                <a:cs typeface="Circular Std Book Italic" panose="020B0604020101020102" pitchFamily="34" charset="0"/>
               </a:rPr>
               <a:t>s2_example3.css</a:t>
             </a:r>
@@ -12365,8 +12365,8 @@
                 <a:solidFill>
                   <a:schemeClr val="bg1"/>
                 </a:solidFill>
-                <a:latin typeface="Circular Std Book" panose="020B0604020101020102" pitchFamily="34" charset="0"/>
-                <a:cs typeface="Circular Std Book" panose="020B0604020101020102" pitchFamily="34" charset="0"/>
+                <a:latin typeface="Circular Std Book Italic" panose="020B0604020101020102" pitchFamily="34" charset="0"/>
+                <a:cs typeface="Circular Std Book Italic" panose="020B0604020101020102" pitchFamily="34" charset="0"/>
               </a:rPr>
               <a:t>” file to start:</a:t>
             </a:r>
@@ -12382,8 +12382,8 @@
                 <a:solidFill>
                   <a:schemeClr val="bg1"/>
                 </a:solidFill>
-                <a:latin typeface="Circular Std Book" panose="020B0604020101020102" pitchFamily="34" charset="0"/>
-                <a:cs typeface="Circular Std Book" panose="020B0604020101020102" pitchFamily="34" charset="0"/>
+                <a:latin typeface="Circular Std Book Italic" panose="020B0604020101020102" pitchFamily="34" charset="0"/>
+                <a:cs typeface="Circular Std Book Italic" panose="020B0604020101020102" pitchFamily="34" charset="0"/>
               </a:rPr>
               <a:t>Beginner: s2_example1.css</a:t>
             </a:r>
@@ -12399,8 +12399,8 @@
                 <a:solidFill>
                   <a:schemeClr val="bg1"/>
                 </a:solidFill>
-                <a:latin typeface="Circular Std Book" panose="020B0604020101020102" pitchFamily="34" charset="0"/>
-                <a:cs typeface="Circular Std Book" panose="020B0604020101020102" pitchFamily="34" charset="0"/>
+                <a:latin typeface="Circular Std Book Italic" panose="020B0604020101020102" pitchFamily="34" charset="0"/>
+                <a:cs typeface="Circular Std Book Italic" panose="020B0604020101020102" pitchFamily="34" charset="0"/>
               </a:rPr>
               <a:t>Intermediate: s2_example2.css</a:t>
             </a:r>
@@ -12416,8 +12416,8 @@
                 <a:solidFill>
                   <a:schemeClr val="bg1"/>
                 </a:solidFill>
-                <a:latin typeface="Circular Std Book" panose="020B0604020101020102" pitchFamily="34" charset="0"/>
-                <a:cs typeface="Circular Std Book" panose="020B0604020101020102" pitchFamily="34" charset="0"/>
+                <a:latin typeface="Circular Std Book Italic" panose="020B0604020101020102" pitchFamily="34" charset="0"/>
+                <a:cs typeface="Circular Std Book Italic" panose="020B0604020101020102" pitchFamily="34" charset="0"/>
               </a:rPr>
               <a:t>Advanced: s2_example3.css</a:t>
             </a:r>
@@ -12433,8 +12433,8 @@
                 <a:solidFill>
                   <a:schemeClr val="bg1"/>
                 </a:solidFill>
-                <a:latin typeface="Circular Std Book" panose="020B0604020101020102" pitchFamily="34" charset="0"/>
-                <a:cs typeface="Circular Std Book" panose="020B0604020101020102" pitchFamily="34" charset="0"/>
+                <a:latin typeface="Circular Std Book Italic" panose="020B0604020101020102" pitchFamily="34" charset="0"/>
+                <a:cs typeface="Circular Std Book Italic" panose="020B0604020101020102" pitchFamily="34" charset="0"/>
               </a:rPr>
               <a:t>Link “</a:t>
             </a:r>
@@ -12443,8 +12443,8 @@
                 <a:solidFill>
                   <a:srgbClr val="F4C245"/>
                 </a:solidFill>
-                <a:latin typeface="Circular Std Book" panose="020B0604020101020102" pitchFamily="34" charset="0"/>
-                <a:cs typeface="Circular Std Book" panose="020B0604020101020102" pitchFamily="34" charset="0"/>
+                <a:latin typeface="Circular Std Book Italic" panose="020B0604020101020102" pitchFamily="34" charset="0"/>
+                <a:cs typeface="Circular Std Book Italic" panose="020B0604020101020102" pitchFamily="34" charset="0"/>
               </a:rPr>
               <a:t>s2_example1.css</a:t>
             </a:r>
@@ -12453,8 +12453,8 @@
                 <a:solidFill>
                   <a:schemeClr val="bg1"/>
                 </a:solidFill>
-                <a:latin typeface="Circular Std Book" panose="020B0604020101020102" pitchFamily="34" charset="0"/>
-                <a:cs typeface="Circular Std Book" panose="020B0604020101020102" pitchFamily="34" charset="0"/>
+                <a:latin typeface="Circular Std Book Italic" panose="020B0604020101020102" pitchFamily="34" charset="0"/>
+                <a:cs typeface="Circular Std Book Italic" panose="020B0604020101020102" pitchFamily="34" charset="0"/>
               </a:rPr>
               <a:t>” (or others) to “</a:t>
             </a:r>
@@ -12463,8 +12463,8 @@
                 <a:solidFill>
                   <a:srgbClr val="F4C245"/>
                 </a:solidFill>
-                <a:latin typeface="Circular Std Book" panose="020B0604020101020102" pitchFamily="34" charset="0"/>
-                <a:cs typeface="Circular Std Book" panose="020B0604020101020102" pitchFamily="34" charset="0"/>
+                <a:latin typeface="Circular Std Book Italic" panose="020B0604020101020102" pitchFamily="34" charset="0"/>
+                <a:cs typeface="Circular Std Book Italic" panose="020B0604020101020102" pitchFamily="34" charset="0"/>
               </a:rPr>
               <a:t>index.html</a:t>
             </a:r>
@@ -12473,8 +12473,8 @@
                 <a:solidFill>
                   <a:schemeClr val="bg1"/>
                 </a:solidFill>
-                <a:latin typeface="Circular Std Book" panose="020B0604020101020102" pitchFamily="34" charset="0"/>
-                <a:cs typeface="Circular Std Book" panose="020B0604020101020102" pitchFamily="34" charset="0"/>
+                <a:latin typeface="Circular Std Book Italic" panose="020B0604020101020102" pitchFamily="34" charset="0"/>
+                <a:cs typeface="Circular Std Book Italic" panose="020B0604020101020102" pitchFamily="34" charset="0"/>
               </a:rPr>
               <a:t>” using: </a:t>
             </a:r>
@@ -12491,8 +12491,8 @@
                 <a:solidFill>
                   <a:schemeClr val="bg1"/>
                 </a:solidFill>
-                <a:latin typeface="Circular Std Book" panose="020B0604020101020102" pitchFamily="34" charset="0"/>
-                <a:cs typeface="Circular Std Book" panose="020B0604020101020102" pitchFamily="34" charset="0"/>
+                <a:latin typeface="Circular Std Book Italic" panose="020B0604020101020102" pitchFamily="34" charset="0"/>
+                <a:cs typeface="Circular Std Book Italic" panose="020B0604020101020102" pitchFamily="34" charset="0"/>
               </a:rPr>
               <a:t>	</a:t>
             </a:r>
@@ -12627,8 +12627,8 @@
                 <a:solidFill>
                   <a:schemeClr val="bg1"/>
                 </a:solidFill>
-                <a:latin typeface="Circular Std Book" panose="020B0604020101020102" pitchFamily="34" charset="0"/>
-                <a:cs typeface="Circular Std Book" panose="020B0604020101020102" pitchFamily="34" charset="0"/>
+                <a:latin typeface="Circular Std Book Italic" panose="020B0604020101020102" pitchFamily="34" charset="0"/>
+                <a:cs typeface="Circular Std Book Italic" panose="020B0604020101020102" pitchFamily="34" charset="0"/>
               </a:rPr>
               <a:t>JSON</a:t>
             </a:r>
@@ -12637,8 +12637,8 @@
                 <a:solidFill>
                   <a:srgbClr val="F4C245"/>
                 </a:solidFill>
-                <a:latin typeface="Circular Std Book" panose="020B0604020101020102" pitchFamily="34" charset="0"/>
-                <a:cs typeface="Circular Std Book" panose="020B0604020101020102" pitchFamily="34" charset="0"/>
+                <a:latin typeface="Circular Std Book Italic" panose="020B0604020101020102" pitchFamily="34" charset="0"/>
+                <a:cs typeface="Circular Std Book Italic" panose="020B0604020101020102" pitchFamily="34" charset="0"/>
               </a:rPr>
               <a:t>.</a:t>
             </a:r>
@@ -12646,8 +12646,8 @@
               <a:solidFill>
                 <a:srgbClr val="F4C245"/>
               </a:solidFill>
-              <a:latin typeface="Circular Std Book" panose="020B0604020101020102" pitchFamily="34" charset="0"/>
-              <a:cs typeface="Circular Std Book" panose="020B0604020101020102" pitchFamily="34" charset="0"/>
+              <a:latin typeface="Circular Std Book Italic" panose="020B0604020101020102" pitchFamily="34" charset="0"/>
+              <a:cs typeface="Circular Std Book Italic" panose="020B0604020101020102" pitchFamily="34" charset="0"/>
             </a:endParaRPr>
           </a:p>
         </p:txBody>
@@ -12690,8 +12690,8 @@
                 <a:solidFill>
                   <a:schemeClr val="bg1"/>
                 </a:solidFill>
-                <a:latin typeface="Circular Std Book" panose="020B0604020101020102" pitchFamily="34" charset="0"/>
-                <a:cs typeface="Circular Std Book" panose="020B0604020101020102" pitchFamily="34" charset="0"/>
+                <a:latin typeface="Circular Std Book Italic" panose="020B0604020101020102" pitchFamily="34" charset="0"/>
+                <a:cs typeface="Circular Std Book Italic" panose="020B0604020101020102" pitchFamily="34" charset="0"/>
               </a:rPr>
               <a:t>Edit your “</a:t>
             </a:r>
@@ -12700,8 +12700,8 @@
                 <a:solidFill>
                   <a:srgbClr val="F4C245"/>
                 </a:solidFill>
-                <a:latin typeface="Circular Std Book" panose="020B0604020101020102" pitchFamily="34" charset="0"/>
-                <a:cs typeface="Circular Std Book" panose="020B0604020101020102" pitchFamily="34" charset="0"/>
+                <a:latin typeface="Circular Std Book Italic" panose="020B0604020101020102" pitchFamily="34" charset="0"/>
+                <a:cs typeface="Circular Std Book Italic" panose="020B0604020101020102" pitchFamily="34" charset="0"/>
               </a:rPr>
               <a:t>index.html</a:t>
             </a:r>
@@ -12710,8 +12710,8 @@
                 <a:solidFill>
                   <a:schemeClr val="bg1"/>
                 </a:solidFill>
-                <a:latin typeface="Circular Std Book" panose="020B0604020101020102" pitchFamily="34" charset="0"/>
-                <a:cs typeface="Circular Std Book" panose="020B0604020101020102" pitchFamily="34" charset="0"/>
+                <a:latin typeface="Circular Std Book Italic" panose="020B0604020101020102" pitchFamily="34" charset="0"/>
+                <a:cs typeface="Circular Std Book Italic" panose="020B0604020101020102" pitchFamily="34" charset="0"/>
               </a:rPr>
               <a:t>” file, and add JSON files to your file structure</a:t>
             </a:r>
@@ -12727,8 +12727,8 @@
                 <a:solidFill>
                   <a:schemeClr val="bg1"/>
                 </a:solidFill>
-                <a:latin typeface="Circular Std Book" panose="020B0604020101020102" pitchFamily="34" charset="0"/>
-                <a:cs typeface="Circular Std Book" panose="020B0604020101020102" pitchFamily="34" charset="0"/>
+                <a:latin typeface="Circular Std Book Italic" panose="020B0604020101020102" pitchFamily="34" charset="0"/>
+                <a:cs typeface="Circular Std Book Italic" panose="020B0604020101020102" pitchFamily="34" charset="0"/>
               </a:rPr>
               <a:t>There are already two example charts embedded in the example HTML. Try replacing these with a chart from Section 1, or adding a new chart altogether</a:t>
             </a:r>
@@ -12878,8 +12878,8 @@
                 <a:solidFill>
                   <a:schemeClr val="bg1"/>
                 </a:solidFill>
-                <a:latin typeface="Circular Std Book" panose="020B0604020101020102" pitchFamily="34" charset="0"/>
-                <a:cs typeface="Circular Std Book" panose="020B0604020101020102" pitchFamily="34" charset="0"/>
+                <a:latin typeface="Circular Std Book Italic" panose="020B0604020101020102" pitchFamily="34" charset="0"/>
+                <a:cs typeface="Circular Std Book Italic" panose="020B0604020101020102" pitchFamily="34" charset="0"/>
               </a:rPr>
               <a:t>Session 2</a:t>
             </a:r>
@@ -12888,8 +12888,8 @@
                 <a:solidFill>
                   <a:srgbClr val="F4C245"/>
                 </a:solidFill>
-                <a:latin typeface="Circular Std Book" panose="020B0604020101020102" pitchFamily="34" charset="0"/>
-                <a:cs typeface="Circular Std Book" panose="020B0604020101020102" pitchFamily="34" charset="0"/>
+                <a:latin typeface="Circular Std Book Italic" panose="020B0604020101020102" pitchFamily="34" charset="0"/>
+                <a:cs typeface="Circular Std Book Italic" panose="020B0604020101020102" pitchFamily="34" charset="0"/>
               </a:rPr>
               <a:t>.</a:t>
             </a:r>
@@ -12898,8 +12898,8 @@
                 <a:solidFill>
                   <a:srgbClr val="36B7B4"/>
                 </a:solidFill>
-                <a:latin typeface="Circular Std Book" panose="020B0604020101020102" pitchFamily="34" charset="0"/>
-                <a:cs typeface="Circular Std Book" panose="020B0604020101020102" pitchFamily="34" charset="0"/>
+                <a:latin typeface="Circular Std Book Italic" panose="020B0604020101020102" pitchFamily="34" charset="0"/>
+                <a:cs typeface="Circular Std Book Italic" panose="020B0604020101020102" pitchFamily="34" charset="0"/>
               </a:rPr>
             </a:br>
             <a:r>
@@ -13085,8 +13085,8 @@
                 <a:solidFill>
                   <a:schemeClr val="bg1"/>
                 </a:solidFill>
-                <a:latin typeface="Circular Std Book" panose="020B0604020101020102" pitchFamily="34" charset="0"/>
-                <a:cs typeface="Circular Std Book" panose="020B0604020101020102" pitchFamily="34" charset="0"/>
+                <a:latin typeface="Circular Std Book Italic" panose="020B0604020101020102" pitchFamily="34" charset="0"/>
+                <a:cs typeface="Circular Std Book Italic" panose="020B0604020101020102" pitchFamily="34" charset="0"/>
               </a:rPr>
               <a:t>Building blocks</a:t>
             </a:r>
@@ -13095,8 +13095,8 @@
                 <a:solidFill>
                   <a:srgbClr val="F4C245"/>
                 </a:solidFill>
-                <a:latin typeface="Circular Std Book" panose="020B0604020101020102" pitchFamily="34" charset="0"/>
-                <a:cs typeface="Circular Std Book" panose="020B0604020101020102" pitchFamily="34" charset="0"/>
+                <a:latin typeface="Circular Std Book Italic" panose="020B0604020101020102" pitchFamily="34" charset="0"/>
+                <a:cs typeface="Circular Std Book Italic" panose="020B0604020101020102" pitchFamily="34" charset="0"/>
               </a:rPr>
               <a:t>.</a:t>
             </a:r>
@@ -13104,8 +13104,8 @@
               <a:solidFill>
                 <a:srgbClr val="F4C245"/>
               </a:solidFill>
-              <a:latin typeface="Circular Std Book" panose="020B0604020101020102" pitchFamily="34" charset="0"/>
-              <a:cs typeface="Circular Std Book" panose="020B0604020101020102" pitchFamily="34" charset="0"/>
+              <a:latin typeface="Circular Std Book Italic" panose="020B0604020101020102" pitchFamily="34" charset="0"/>
+              <a:cs typeface="Circular Std Book Italic" panose="020B0604020101020102" pitchFamily="34" charset="0"/>
             </a:endParaRPr>
           </a:p>
         </p:txBody>
@@ -13256,9 +13256,9 @@
                 <a:effectLst/>
                 <a:uLnTx/>
                 <a:uFillTx/>
-                <a:latin typeface="Circular Std Book" panose="020B0604020101020102" pitchFamily="34" charset="0"/>
+                <a:latin typeface="Circular Std Book Italic" panose="020B0604020101020102" pitchFamily="34" charset="0"/>
                 <a:ea typeface="+mj-ea"/>
-                <a:cs typeface="Circular Std Book" panose="020B0604020101020102" pitchFamily="34" charset="0"/>
+                <a:cs typeface="Circular Std Book Italic" panose="020B0604020101020102" pitchFamily="34" charset="0"/>
               </a:rPr>
               <a:t>Most used languages, 2023</a:t>
             </a:r>
@@ -13273,9 +13273,9 @@
                 <a:effectLst/>
                 <a:uLnTx/>
                 <a:uFillTx/>
-                <a:latin typeface="Circular Std Book" panose="020B0604020101020102" pitchFamily="34" charset="0"/>
+                <a:latin typeface="Circular Std Book Italic" panose="020B0604020101020102" pitchFamily="34" charset="0"/>
                 <a:ea typeface="+mj-ea"/>
-                <a:cs typeface="Circular Std Book" panose="020B0604020101020102" pitchFamily="34" charset="0"/>
+                <a:cs typeface="Circular Std Book Italic" panose="020B0604020101020102" pitchFamily="34" charset="0"/>
               </a:rPr>
               <a:t>.</a:t>
             </a:r>
@@ -13537,8 +13537,8 @@
                 <a:solidFill>
                   <a:schemeClr val="bg1"/>
                 </a:solidFill>
-                <a:latin typeface="Circular Std Book" panose="020B0604020101020102" pitchFamily="34" charset="0"/>
-                <a:cs typeface="Circular Std Book" panose="020B0604020101020102" pitchFamily="34" charset="0"/>
+                <a:latin typeface="Circular Std Book Italic" panose="020B0604020101020102" pitchFamily="34" charset="0"/>
+                <a:cs typeface="Circular Std Book Italic" panose="020B0604020101020102" pitchFamily="34" charset="0"/>
               </a:rPr>
               <a:t>HTML</a:t>
             </a:r>
@@ -13547,8 +13547,8 @@
                 <a:solidFill>
                   <a:srgbClr val="F4C245"/>
                 </a:solidFill>
-                <a:latin typeface="Circular Std Book" panose="020B0604020101020102" pitchFamily="34" charset="0"/>
-                <a:cs typeface="Circular Std Book" panose="020B0604020101020102" pitchFamily="34" charset="0"/>
+                <a:latin typeface="Circular Std Book Italic" panose="020B0604020101020102" pitchFamily="34" charset="0"/>
+                <a:cs typeface="Circular Std Book Italic" panose="020B0604020101020102" pitchFamily="34" charset="0"/>
               </a:rPr>
               <a:t>.</a:t>
             </a:r>
@@ -13594,8 +13594,8 @@
                 <a:solidFill>
                   <a:srgbClr val="FFC000"/>
                 </a:solidFill>
-                <a:latin typeface="Circular Std Book" panose="020B0604020101020102" pitchFamily="34" charset="0"/>
-                <a:cs typeface="Circular Std Book" panose="020B0604020101020102" pitchFamily="34" charset="0"/>
+                <a:latin typeface="Circular Std Book Italic" panose="020B0604020101020102" pitchFamily="34" charset="0"/>
+                <a:cs typeface="Circular Std Book Italic" panose="020B0604020101020102" pitchFamily="34" charset="0"/>
               </a:rPr>
               <a:t>H</a:t>
             </a:r>
@@ -13604,8 +13604,8 @@
                 <a:solidFill>
                   <a:srgbClr val="36B7B4"/>
                 </a:solidFill>
-                <a:latin typeface="Circular Std Book" panose="020B0604020101020102" pitchFamily="34" charset="0"/>
-                <a:cs typeface="Circular Std Book" panose="020B0604020101020102" pitchFamily="34" charset="0"/>
+                <a:latin typeface="Circular Std Book Italic" panose="020B0604020101020102" pitchFamily="34" charset="0"/>
+                <a:cs typeface="Circular Std Book Italic" panose="020B0604020101020102" pitchFamily="34" charset="0"/>
               </a:rPr>
               <a:t>yper-</a:t>
             </a:r>
@@ -13614,8 +13614,8 @@
                 <a:solidFill>
                   <a:srgbClr val="FFC000"/>
                 </a:solidFill>
-                <a:latin typeface="Circular Std Book" panose="020B0604020101020102" pitchFamily="34" charset="0"/>
-                <a:cs typeface="Circular Std Book" panose="020B0604020101020102" pitchFamily="34" charset="0"/>
+                <a:latin typeface="Circular Std Book Italic" panose="020B0604020101020102" pitchFamily="34" charset="0"/>
+                <a:cs typeface="Circular Std Book Italic" panose="020B0604020101020102" pitchFamily="34" charset="0"/>
               </a:rPr>
               <a:t>T</a:t>
             </a:r>
@@ -13624,8 +13624,8 @@
                 <a:solidFill>
                   <a:srgbClr val="36B7B4"/>
                 </a:solidFill>
-                <a:latin typeface="Circular Std Book" panose="020B0604020101020102" pitchFamily="34" charset="0"/>
-                <a:cs typeface="Circular Std Book" panose="020B0604020101020102" pitchFamily="34" charset="0"/>
+                <a:latin typeface="Circular Std Book Italic" panose="020B0604020101020102" pitchFamily="34" charset="0"/>
+                <a:cs typeface="Circular Std Book Italic" panose="020B0604020101020102" pitchFamily="34" charset="0"/>
               </a:rPr>
               <a:t>ext </a:t>
             </a:r>
@@ -13634,8 +13634,8 @@
                 <a:solidFill>
                   <a:srgbClr val="FFC000"/>
                 </a:solidFill>
-                <a:latin typeface="Circular Std Book" panose="020B0604020101020102" pitchFamily="34" charset="0"/>
-                <a:cs typeface="Circular Std Book" panose="020B0604020101020102" pitchFamily="34" charset="0"/>
+                <a:latin typeface="Circular Std Book Italic" panose="020B0604020101020102" pitchFamily="34" charset="0"/>
+                <a:cs typeface="Circular Std Book Italic" panose="020B0604020101020102" pitchFamily="34" charset="0"/>
               </a:rPr>
               <a:t>M</a:t>
             </a:r>
@@ -13644,8 +13644,8 @@
                 <a:solidFill>
                   <a:srgbClr val="36B7B4"/>
                 </a:solidFill>
-                <a:latin typeface="Circular Std Book" panose="020B0604020101020102" pitchFamily="34" charset="0"/>
-                <a:cs typeface="Circular Std Book" panose="020B0604020101020102" pitchFamily="34" charset="0"/>
+                <a:latin typeface="Circular Std Book Italic" panose="020B0604020101020102" pitchFamily="34" charset="0"/>
+                <a:cs typeface="Circular Std Book Italic" panose="020B0604020101020102" pitchFamily="34" charset="0"/>
               </a:rPr>
               <a:t>arkup </a:t>
             </a:r>
@@ -13654,8 +13654,8 @@
                 <a:solidFill>
                   <a:srgbClr val="FFC000"/>
                 </a:solidFill>
-                <a:latin typeface="Circular Std Book" panose="020B0604020101020102" pitchFamily="34" charset="0"/>
-                <a:cs typeface="Circular Std Book" panose="020B0604020101020102" pitchFamily="34" charset="0"/>
+                <a:latin typeface="Circular Std Book Italic" panose="020B0604020101020102" pitchFamily="34" charset="0"/>
+                <a:cs typeface="Circular Std Book Italic" panose="020B0604020101020102" pitchFamily="34" charset="0"/>
               </a:rPr>
               <a:t>L</a:t>
             </a:r>
@@ -13664,8 +13664,8 @@
                 <a:solidFill>
                   <a:srgbClr val="36B7B4"/>
                 </a:solidFill>
-                <a:latin typeface="Circular Std Book" panose="020B0604020101020102" pitchFamily="34" charset="0"/>
-                <a:cs typeface="Circular Std Book" panose="020B0604020101020102" pitchFamily="34" charset="0"/>
+                <a:latin typeface="Circular Std Book Italic" panose="020B0604020101020102" pitchFamily="34" charset="0"/>
+                <a:cs typeface="Circular Std Book Italic" panose="020B0604020101020102" pitchFamily="34" charset="0"/>
               </a:rPr>
               <a:t>anguage</a:t>
             </a:r>
@@ -13681,8 +13681,8 @@
                 <a:solidFill>
                   <a:srgbClr val="36B7B4"/>
                 </a:solidFill>
-                <a:latin typeface="Circular Std Book" panose="020B0604020101020102" pitchFamily="34" charset="0"/>
-                <a:cs typeface="Circular Std Book" panose="020B0604020101020102" pitchFamily="34" charset="0"/>
+                <a:latin typeface="Circular Std Book Italic" panose="020B0604020101020102" pitchFamily="34" charset="0"/>
+                <a:cs typeface="Circular Std Book Italic" panose="020B0604020101020102" pitchFamily="34" charset="0"/>
               </a:rPr>
               <a:t>1993. </a:t>
             </a:r>
@@ -13691,8 +13691,8 @@
                 <a:solidFill>
                   <a:schemeClr val="bg1"/>
                 </a:solidFill>
-                <a:latin typeface="Circular Std Book" panose="020B0604020101020102" pitchFamily="34" charset="0"/>
-                <a:cs typeface="Circular Std Book" panose="020B0604020101020102" pitchFamily="34" charset="0"/>
+                <a:latin typeface="Circular Std Book Italic" panose="020B0604020101020102" pitchFamily="34" charset="0"/>
+                <a:cs typeface="Circular Std Book Italic" panose="020B0604020101020102" pitchFamily="34" charset="0"/>
               </a:rPr>
               <a:t>Invented at CERN by Tim Berners-Lee.</a:t>
             </a:r>
@@ -13708,8 +13708,8 @@
                 <a:solidFill>
                   <a:srgbClr val="36B7B4"/>
                 </a:solidFill>
-                <a:latin typeface="Circular Std Book" panose="020B0604020101020102" pitchFamily="34" charset="0"/>
-                <a:cs typeface="Circular Std Book" panose="020B0604020101020102" pitchFamily="34" charset="0"/>
+                <a:latin typeface="Circular Std Book Italic" panose="020B0604020101020102" pitchFamily="34" charset="0"/>
+                <a:cs typeface="Circular Std Book Italic" panose="020B0604020101020102" pitchFamily="34" charset="0"/>
               </a:rPr>
               <a:t>Big idea. </a:t>
             </a:r>
@@ -13718,8 +13718,8 @@
                 <a:solidFill>
                   <a:schemeClr val="bg1"/>
                 </a:solidFill>
-                <a:latin typeface="Circular Std Book" panose="020B0604020101020102" pitchFamily="34" charset="0"/>
-                <a:cs typeface="Circular Std Book" panose="020B0604020101020102" pitchFamily="34" charset="0"/>
+                <a:latin typeface="Circular Std Book Italic" panose="020B0604020101020102" pitchFamily="34" charset="0"/>
+                <a:cs typeface="Circular Std Book Italic" panose="020B0604020101020102" pitchFamily="34" charset="0"/>
               </a:rPr>
               <a:t>The </a:t>
             </a:r>
@@ -13728,8 +13728,8 @@
                 <a:solidFill>
                   <a:srgbClr val="F4C245"/>
                 </a:solidFill>
-                <a:latin typeface="Circular Std Book" panose="020B0604020101020102" pitchFamily="34" charset="0"/>
-                <a:cs typeface="Circular Std Book" panose="020B0604020101020102" pitchFamily="34" charset="0"/>
+                <a:latin typeface="Circular Std Book Italic" panose="020B0604020101020102" pitchFamily="34" charset="0"/>
+                <a:cs typeface="Circular Std Book Italic" panose="020B0604020101020102" pitchFamily="34" charset="0"/>
               </a:rPr>
               <a:t>HT</a:t>
             </a:r>
@@ -13738,8 +13738,8 @@
                 <a:solidFill>
                   <a:schemeClr val="bg1"/>
                 </a:solidFill>
-                <a:latin typeface="Circular Std Book" panose="020B0604020101020102" pitchFamily="34" charset="0"/>
-                <a:cs typeface="Circular Std Book" panose="020B0604020101020102" pitchFamily="34" charset="0"/>
+                <a:latin typeface="Circular Std Book Italic" panose="020B0604020101020102" pitchFamily="34" charset="0"/>
+                <a:cs typeface="Circular Std Book Italic" panose="020B0604020101020102" pitchFamily="34" charset="0"/>
               </a:rPr>
               <a:t> in the name is the big idea. There are/were lots of markup languages, but HTML linked joined documents together, by adding hyperlinks. </a:t>
             </a:r>
@@ -13754,8 +13754,8 @@
               <a:solidFill>
                 <a:srgbClr val="36B7B4"/>
               </a:solidFill>
-              <a:latin typeface="Circular Std Book" panose="020B0604020101020102" pitchFamily="34" charset="0"/>
-              <a:cs typeface="Circular Std Book" panose="020B0604020101020102" pitchFamily="34" charset="0"/>
+              <a:latin typeface="Circular Std Book Italic" panose="020B0604020101020102" pitchFamily="34" charset="0"/>
+              <a:cs typeface="Circular Std Book Italic" panose="020B0604020101020102" pitchFamily="34" charset="0"/>
             </a:endParaRPr>
           </a:p>
           <a:p>
@@ -13768,8 +13768,8 @@
               <a:solidFill>
                 <a:srgbClr val="36B7B4"/>
               </a:solidFill>
-              <a:latin typeface="Circular Std Book" panose="020B0604020101020102" pitchFamily="34" charset="0"/>
-              <a:cs typeface="Circular Std Book" panose="020B0604020101020102" pitchFamily="34" charset="0"/>
+              <a:latin typeface="Circular Std Book Italic" panose="020B0604020101020102" pitchFamily="34" charset="0"/>
+              <a:cs typeface="Circular Std Book Italic" panose="020B0604020101020102" pitchFamily="34" charset="0"/>
             </a:endParaRPr>
           </a:p>
           <a:p>
@@ -13782,8 +13782,8 @@
               <a:solidFill>
                 <a:schemeClr val="bg1"/>
               </a:solidFill>
-              <a:latin typeface="Circular Std Book" panose="020B0604020101020102" pitchFamily="34" charset="0"/>
-              <a:cs typeface="Circular Std Book" panose="020B0604020101020102" pitchFamily="34" charset="0"/>
+              <a:latin typeface="Circular Std Book Italic" panose="020B0604020101020102" pitchFamily="34" charset="0"/>
+              <a:cs typeface="Circular Std Book Italic" panose="020B0604020101020102" pitchFamily="34" charset="0"/>
             </a:endParaRPr>
           </a:p>
           <a:p>
@@ -13796,8 +13796,8 @@
               <a:solidFill>
                 <a:srgbClr val="0063AF"/>
               </a:solidFill>
-              <a:latin typeface="Circular Std Book" panose="020B0604020101020102" pitchFamily="34" charset="0"/>
-              <a:cs typeface="Circular Std Book" panose="020B0604020101020102" pitchFamily="34" charset="0"/>
+              <a:latin typeface="Circular Std Book Italic" panose="020B0604020101020102" pitchFamily="34" charset="0"/>
+              <a:cs typeface="Circular Std Book Italic" panose="020B0604020101020102" pitchFamily="34" charset="0"/>
             </a:endParaRPr>
           </a:p>
         </p:txBody>
@@ -14186,8 +14186,8 @@
                 <a:solidFill>
                   <a:schemeClr val="bg1"/>
                 </a:solidFill>
-                <a:latin typeface="Circular Std Book" panose="020B0604020101020102" pitchFamily="34" charset="0"/>
-                <a:cs typeface="Circular Std Book" panose="020B0604020101020102" pitchFamily="34" charset="0"/>
+                <a:latin typeface="Circular Std Book Italic" panose="020B0604020101020102" pitchFamily="34" charset="0"/>
+                <a:cs typeface="Circular Std Book Italic" panose="020B0604020101020102" pitchFamily="34" charset="0"/>
               </a:rPr>
               <a:t>HTML example</a:t>
             </a:r>
@@ -14196,8 +14196,8 @@
                 <a:solidFill>
                   <a:srgbClr val="F4C245"/>
                 </a:solidFill>
-                <a:latin typeface="Circular Std Book" panose="020B0604020101020102" pitchFamily="34" charset="0"/>
-                <a:cs typeface="Circular Std Book" panose="020B0604020101020102" pitchFamily="34" charset="0"/>
+                <a:latin typeface="Circular Std Book Italic" panose="020B0604020101020102" pitchFamily="34" charset="0"/>
+                <a:cs typeface="Circular Std Book Italic" panose="020B0604020101020102" pitchFamily="34" charset="0"/>
               </a:rPr>
               <a:t>.</a:t>
             </a:r>
@@ -14664,8 +14664,8 @@
                 <a:solidFill>
                   <a:schemeClr val="bg1"/>
                 </a:solidFill>
-                <a:latin typeface="Circular Std Book" panose="020B0604020101020102" pitchFamily="34" charset="0"/>
-                <a:cs typeface="Circular Std Book" panose="020B0604020101020102" pitchFamily="34" charset="0"/>
+                <a:latin typeface="Circular Std Book Italic" panose="020B0604020101020102" pitchFamily="34" charset="0"/>
+                <a:cs typeface="Circular Std Book Italic" panose="020B0604020101020102" pitchFamily="34" charset="0"/>
               </a:rPr>
               <a:t>CSS</a:t>
             </a:r>
@@ -14674,8 +14674,8 @@
                 <a:solidFill>
                   <a:srgbClr val="F4C245"/>
                 </a:solidFill>
-                <a:latin typeface="Circular Std Book" panose="020B0604020101020102" pitchFamily="34" charset="0"/>
-                <a:cs typeface="Circular Std Book" panose="020B0604020101020102" pitchFamily="34" charset="0"/>
+                <a:latin typeface="Circular Std Book Italic" panose="020B0604020101020102" pitchFamily="34" charset="0"/>
+                <a:cs typeface="Circular Std Book Italic" panose="020B0604020101020102" pitchFamily="34" charset="0"/>
               </a:rPr>
               <a:t>.</a:t>
             </a:r>
@@ -14721,8 +14721,8 @@
                 <a:solidFill>
                   <a:srgbClr val="FFC000"/>
                 </a:solidFill>
-                <a:latin typeface="Circular Std Book" panose="020B0604020101020102" pitchFamily="34" charset="0"/>
-                <a:cs typeface="Circular Std Book" panose="020B0604020101020102" pitchFamily="34" charset="0"/>
+                <a:latin typeface="Circular Std Book Italic" panose="020B0604020101020102" pitchFamily="34" charset="0"/>
+                <a:cs typeface="Circular Std Book Italic" panose="020B0604020101020102" pitchFamily="34" charset="0"/>
               </a:rPr>
               <a:t>C</a:t>
             </a:r>
@@ -14731,8 +14731,8 @@
                 <a:solidFill>
                   <a:srgbClr val="36B7B4"/>
                 </a:solidFill>
-                <a:latin typeface="Circular Std Book" panose="020B0604020101020102" pitchFamily="34" charset="0"/>
-                <a:cs typeface="Circular Std Book" panose="020B0604020101020102" pitchFamily="34" charset="0"/>
+                <a:latin typeface="Circular Std Book Italic" panose="020B0604020101020102" pitchFamily="34" charset="0"/>
+                <a:cs typeface="Circular Std Book Italic" panose="020B0604020101020102" pitchFamily="34" charset="0"/>
               </a:rPr>
               <a:t>ascading </a:t>
             </a:r>
@@ -14741,8 +14741,8 @@
                 <a:solidFill>
                   <a:srgbClr val="FFC000"/>
                 </a:solidFill>
-                <a:latin typeface="Circular Std Book" panose="020B0604020101020102" pitchFamily="34" charset="0"/>
-                <a:cs typeface="Circular Std Book" panose="020B0604020101020102" pitchFamily="34" charset="0"/>
+                <a:latin typeface="Circular Std Book Italic" panose="020B0604020101020102" pitchFamily="34" charset="0"/>
+                <a:cs typeface="Circular Std Book Italic" panose="020B0604020101020102" pitchFamily="34" charset="0"/>
               </a:rPr>
               <a:t>S</a:t>
             </a:r>
@@ -14751,8 +14751,8 @@
                 <a:solidFill>
                   <a:srgbClr val="36B7B4"/>
                 </a:solidFill>
-                <a:latin typeface="Circular Std Book" panose="020B0604020101020102" pitchFamily="34" charset="0"/>
-                <a:cs typeface="Circular Std Book" panose="020B0604020101020102" pitchFamily="34" charset="0"/>
+                <a:latin typeface="Circular Std Book Italic" panose="020B0604020101020102" pitchFamily="34" charset="0"/>
+                <a:cs typeface="Circular Std Book Italic" panose="020B0604020101020102" pitchFamily="34" charset="0"/>
               </a:rPr>
               <a:t>tyle </a:t>
             </a:r>
@@ -14761,8 +14761,8 @@
                 <a:solidFill>
                   <a:srgbClr val="FFC000"/>
                 </a:solidFill>
-                <a:latin typeface="Circular Std Book" panose="020B0604020101020102" pitchFamily="34" charset="0"/>
-                <a:cs typeface="Circular Std Book" panose="020B0604020101020102" pitchFamily="34" charset="0"/>
+                <a:latin typeface="Circular Std Book Italic" panose="020B0604020101020102" pitchFamily="34" charset="0"/>
+                <a:cs typeface="Circular Std Book Italic" panose="020B0604020101020102" pitchFamily="34" charset="0"/>
               </a:rPr>
               <a:t>S</a:t>
             </a:r>
@@ -14771,8 +14771,8 @@
                 <a:solidFill>
                   <a:srgbClr val="36B7B4"/>
                 </a:solidFill>
-                <a:latin typeface="Circular Std Book" panose="020B0604020101020102" pitchFamily="34" charset="0"/>
-                <a:cs typeface="Circular Std Book" panose="020B0604020101020102" pitchFamily="34" charset="0"/>
+                <a:latin typeface="Circular Std Book Italic" panose="020B0604020101020102" pitchFamily="34" charset="0"/>
+                <a:cs typeface="Circular Std Book Italic" panose="020B0604020101020102" pitchFamily="34" charset="0"/>
               </a:rPr>
               <a:t>heets</a:t>
             </a:r>
@@ -14780,8 +14780,8 @@
               <a:solidFill>
                 <a:schemeClr val="bg1"/>
               </a:solidFill>
-              <a:latin typeface="Circular Std Book" panose="020B0604020101020102" pitchFamily="34" charset="0"/>
-              <a:cs typeface="Circular Std Book" panose="020B0604020101020102" pitchFamily="34" charset="0"/>
+              <a:latin typeface="Circular Std Book Italic" panose="020B0604020101020102" pitchFamily="34" charset="0"/>
+              <a:cs typeface="Circular Std Book Italic" panose="020B0604020101020102" pitchFamily="34" charset="0"/>
             </a:endParaRPr>
           </a:p>
           <a:p>
@@ -14795,8 +14795,8 @@
                 <a:solidFill>
                   <a:srgbClr val="36B7B4"/>
                 </a:solidFill>
-                <a:latin typeface="Circular Std Book" panose="020B0604020101020102" pitchFamily="34" charset="0"/>
-                <a:cs typeface="Circular Std Book" panose="020B0604020101020102" pitchFamily="34" charset="0"/>
+                <a:latin typeface="Circular Std Book Italic" panose="020B0604020101020102" pitchFamily="34" charset="0"/>
+                <a:cs typeface="Circular Std Book Italic" panose="020B0604020101020102" pitchFamily="34" charset="0"/>
               </a:rPr>
               <a:t>1994.  </a:t>
             </a:r>
@@ -14805,8 +14805,8 @@
                 <a:solidFill>
                   <a:schemeClr val="bg1"/>
                 </a:solidFill>
-                <a:latin typeface="Circular Std Book" panose="020B0604020101020102" pitchFamily="34" charset="0"/>
-                <a:cs typeface="Circular Std Book" panose="020B0604020101020102" pitchFamily="34" charset="0"/>
+                <a:latin typeface="Circular Std Book Italic" panose="020B0604020101020102" pitchFamily="34" charset="0"/>
+                <a:cs typeface="Circular Std Book Italic" panose="020B0604020101020102" pitchFamily="34" charset="0"/>
               </a:rPr>
               <a:t>First proposal – again at CERN.</a:t>
             </a:r>
@@ -14822,8 +14822,8 @@
                 <a:solidFill>
                   <a:schemeClr val="bg1"/>
                 </a:solidFill>
-                <a:latin typeface="Circular Std Book" panose="020B0604020101020102" pitchFamily="34" charset="0"/>
-                <a:cs typeface="Circular Std Book" panose="020B0604020101020102" pitchFamily="34" charset="0"/>
+                <a:latin typeface="Circular Std Book Italic" panose="020B0604020101020102" pitchFamily="34" charset="0"/>
+                <a:cs typeface="Circular Std Book Italic" panose="020B0604020101020102" pitchFamily="34" charset="0"/>
               </a:rPr>
               <a:t>Applies styles to the different parts of your site. </a:t>
             </a:r>
@@ -14839,8 +14839,8 @@
                 <a:solidFill>
                   <a:schemeClr val="bg1"/>
                 </a:solidFill>
-                <a:latin typeface="Circular Std Book" panose="020B0604020101020102" pitchFamily="34" charset="0"/>
-                <a:cs typeface="Circular Std Book" panose="020B0604020101020102" pitchFamily="34" charset="0"/>
+                <a:latin typeface="Circular Std Book Italic" panose="020B0604020101020102" pitchFamily="34" charset="0"/>
+                <a:cs typeface="Circular Std Book Italic" panose="020B0604020101020102" pitchFamily="34" charset="0"/>
               </a:rPr>
               <a:t>Challenge is to link the styles you chose, to the parts of your site where you wanted them.</a:t>
             </a:r>
@@ -14856,8 +14856,8 @@
                 <a:solidFill>
                   <a:schemeClr val="bg1"/>
                 </a:solidFill>
-                <a:latin typeface="Circular Std Book" panose="020B0604020101020102" pitchFamily="34" charset="0"/>
-                <a:cs typeface="Circular Std Book" panose="020B0604020101020102" pitchFamily="34" charset="0"/>
+                <a:latin typeface="Circular Std Book Italic" panose="020B0604020101020102" pitchFamily="34" charset="0"/>
+                <a:cs typeface="Circular Std Book Italic" panose="020B0604020101020102" pitchFamily="34" charset="0"/>
               </a:rPr>
               <a:t>This is done using tags (also classes and  ids)</a:t>
             </a:r>
@@ -14872,8 +14872,8 @@
               <a:solidFill>
                 <a:srgbClr val="36B7B4"/>
               </a:solidFill>
-              <a:latin typeface="Circular Std Book" panose="020B0604020101020102" pitchFamily="34" charset="0"/>
-              <a:cs typeface="Circular Std Book" panose="020B0604020101020102" pitchFamily="34" charset="0"/>
+              <a:latin typeface="Circular Std Book Italic" panose="020B0604020101020102" pitchFamily="34" charset="0"/>
+              <a:cs typeface="Circular Std Book Italic" panose="020B0604020101020102" pitchFamily="34" charset="0"/>
             </a:endParaRPr>
           </a:p>
           <a:p>
@@ -14886,8 +14886,8 @@
               <a:solidFill>
                 <a:schemeClr val="bg1"/>
               </a:solidFill>
-              <a:latin typeface="Circular Std Book" panose="020B0604020101020102" pitchFamily="34" charset="0"/>
-              <a:cs typeface="Circular Std Book" panose="020B0604020101020102" pitchFamily="34" charset="0"/>
+              <a:latin typeface="Circular Std Book Italic" panose="020B0604020101020102" pitchFamily="34" charset="0"/>
+              <a:cs typeface="Circular Std Book Italic" panose="020B0604020101020102" pitchFamily="34" charset="0"/>
             </a:endParaRPr>
           </a:p>
           <a:p>
@@ -14900,8 +14900,8 @@
               <a:solidFill>
                 <a:srgbClr val="0063AF"/>
               </a:solidFill>
-              <a:latin typeface="Circular Std Book" panose="020B0604020101020102" pitchFamily="34" charset="0"/>
-              <a:cs typeface="Circular Std Book" panose="020B0604020101020102" pitchFamily="34" charset="0"/>
+              <a:latin typeface="Circular Std Book Italic" panose="020B0604020101020102" pitchFamily="34" charset="0"/>
+              <a:cs typeface="Circular Std Book Italic" panose="020B0604020101020102" pitchFamily="34" charset="0"/>
             </a:endParaRPr>
           </a:p>
         </p:txBody>
@@ -14939,8 +14939,8 @@
                 <a:solidFill>
                   <a:schemeClr val="bg1"/>
                 </a:solidFill>
-                <a:latin typeface="Circular Std Book" panose="020B0604020101020102" pitchFamily="34" charset="77"/>
-                <a:cs typeface="Circular Std Book" panose="020B0604020101020102" pitchFamily="34" charset="77"/>
+                <a:latin typeface="Circular Std Book Italic" panose="020B0604020101020102" pitchFamily="34" charset="77"/>
+                <a:cs typeface="Circular Std Book Italic" panose="020B0604020101020102" pitchFamily="34" charset="77"/>
               </a:rPr>
               <a:t>No CSS applied:</a:t>
             </a:r>
@@ -14980,8 +14980,8 @@
                 <a:solidFill>
                   <a:schemeClr val="bg1"/>
                 </a:solidFill>
-                <a:latin typeface="Circular Std Book" panose="020B0604020101020102" pitchFamily="34" charset="77"/>
-                <a:cs typeface="Circular Std Book" panose="020B0604020101020102" pitchFamily="34" charset="77"/>
+                <a:latin typeface="Circular Std Book Italic" panose="020B0604020101020102" pitchFamily="34" charset="77"/>
+                <a:cs typeface="Circular Std Book Italic" panose="020B0604020101020102" pitchFamily="34" charset="77"/>
               </a:rPr>
               <a:t>CSS applied:</a:t>
             </a:r>
@@ -15179,8 +15179,8 @@
                 <a:solidFill>
                   <a:schemeClr val="bg1"/>
                 </a:solidFill>
-                <a:latin typeface="Circular Std Book" panose="020B0604020101020102" pitchFamily="34" charset="0"/>
-                <a:cs typeface="Circular Std Book" panose="020B0604020101020102" pitchFamily="34" charset="0"/>
+                <a:latin typeface="Circular Std Book Italic" panose="020B0604020101020102" pitchFamily="34" charset="0"/>
+                <a:cs typeface="Circular Std Book Italic" panose="020B0604020101020102" pitchFamily="34" charset="0"/>
               </a:rPr>
               <a:t>CSS example</a:t>
             </a:r>
@@ -15189,8 +15189,8 @@
                 <a:solidFill>
                   <a:srgbClr val="F4C245"/>
                 </a:solidFill>
-                <a:latin typeface="Circular Std Book" panose="020B0604020101020102" pitchFamily="34" charset="0"/>
-                <a:cs typeface="Circular Std Book" panose="020B0604020101020102" pitchFamily="34" charset="0"/>
+                <a:latin typeface="Circular Std Book Italic" panose="020B0604020101020102" pitchFamily="34" charset="0"/>
+                <a:cs typeface="Circular Std Book Italic" panose="020B0604020101020102" pitchFamily="34" charset="0"/>
               </a:rPr>
               <a:t>.</a:t>
             </a:r>

</xml_diff>